<commit_message>
Enhance PowerPoint slide handling by adding support for multiple slide layouts and improving slide creation methods
</commit_message>
<xml_diff>
--- a/default_templates/default_pptx_template_16_9.pptx
+++ b/default_templates/default_pptx_template_16_9.pptx
@@ -8,7 +8,7 @@
   <p:notesSz cx="6858000" cy="9144000"/>
   <p:defaultTextStyle>
     <a:defPPr>
-      <a:defRPr lang="en-US"/>
+      <a:defRPr lang="cs-CZ"/>
     </a:defPPr>
     <a:lvl1pPr marL="0" algn="l" defTabSz="914400" rtl="0" eaLnBrk="1" latinLnBrk="0" hangingPunct="1">
       <a:defRPr sz="1800" kern="1200">
@@ -110,8 +110,8 @@
 </file>
 
 <file path=ppt/slideLayouts/slideLayout1.xml><?xml version="1.0" encoding="utf-8"?>
-<p:sldLayout xmlns:a="http://schemas.openxmlformats.org/drawingml/2006/main" xmlns:r="http://schemas.openxmlformats.org/officeDocument/2006/relationships" xmlns:p="http://schemas.openxmlformats.org/presentationml/2006/main" type="twoObj" preserve="1">
-  <p:cSld name="Two Content">
+<p:sldLayout xmlns:a="http://schemas.openxmlformats.org/drawingml/2006/main" xmlns:r="http://schemas.openxmlformats.org/officeDocument/2006/relationships" xmlns:p="http://schemas.openxmlformats.org/presentationml/2006/main" type="title" preserve="1">
+  <p:cSld name="Úvodní snímek">
     <p:spTree>
       <p:nvGrpSpPr>
         <p:cNvPr id="1" name=""/>
@@ -128,162 +128,117 @@
       </p:grpSpPr>
       <p:sp>
         <p:nvSpPr>
-          <p:cNvPr id="2" name="Title 1">
-            <a:extLst>
-              <a:ext uri="{FF2B5EF4-FFF2-40B4-BE49-F238E27FC236}">
-                <a16:creationId xmlns:a16="http://schemas.microsoft.com/office/drawing/2014/main" id="{9FC799AC-9C05-6131-0F67-0014E5DE5BD8}"/>
-              </a:ext>
-            </a:extLst>
-          </p:cNvPr>
-          <p:cNvSpPr>
-            <a:spLocks noGrp="1"/>
-          </p:cNvSpPr>
-          <p:nvPr>
-            <p:ph type="title"/>
-          </p:nvPr>
-        </p:nvSpPr>
-        <p:spPr/>
-        <p:txBody>
-          <a:bodyPr/>
-          <a:lstStyle/>
-          <a:p>
-            <a:r>
-              <a:rPr lang="en-US"/>
-              <a:t>Click to edit Master title style</a:t>
-            </a:r>
-          </a:p>
-        </p:txBody>
-      </p:sp>
-      <p:sp>
-        <p:nvSpPr>
-          <p:cNvPr id="3" name="Content Placeholder 2">
-            <a:extLst>
-              <a:ext uri="{FF2B5EF4-FFF2-40B4-BE49-F238E27FC236}">
-                <a16:creationId xmlns:a16="http://schemas.microsoft.com/office/drawing/2014/main" id="{1884B4AB-52CC-ABE1-5D55-D150E5F6719C}"/>
-              </a:ext>
-            </a:extLst>
-          </p:cNvPr>
-          <p:cNvSpPr>
-            <a:spLocks noGrp="1"/>
-          </p:cNvSpPr>
-          <p:nvPr>
-            <p:ph sz="half" idx="1"/>
+          <p:cNvPr id="2" name="Nadpis 1">
+            <a:extLst>
+              <a:ext uri="{FF2B5EF4-FFF2-40B4-BE49-F238E27FC236}">
+                <a16:creationId xmlns:a16="http://schemas.microsoft.com/office/drawing/2014/main" id="{676D5FCB-5DF6-D0CD-CCD7-CE67E7F1A616}"/>
+              </a:ext>
+            </a:extLst>
+          </p:cNvPr>
+          <p:cNvSpPr>
+            <a:spLocks noGrp="1"/>
+          </p:cNvSpPr>
+          <p:nvPr>
+            <p:ph type="ctrTitle"/>
           </p:nvPr>
         </p:nvSpPr>
         <p:spPr>
           <a:xfrm>
-            <a:off x="838200" y="1825625"/>
-            <a:ext cx="5181600" cy="4351338"/>
+            <a:off x="1524000" y="1122363"/>
+            <a:ext cx="9144000" cy="2387600"/>
           </a:xfrm>
         </p:spPr>
         <p:txBody>
-          <a:bodyPr/>
-          <a:lstStyle/>
-          <a:p>
-            <a:pPr lvl="0"/>
-            <a:r>
-              <a:rPr lang="en-US"/>
-              <a:t>Click to edit Master text styles</a:t>
-            </a:r>
-          </a:p>
-          <a:p>
-            <a:pPr lvl="1"/>
-            <a:r>
-              <a:rPr lang="en-US"/>
-              <a:t>Second level</a:t>
-            </a:r>
-          </a:p>
-          <a:p>
-            <a:pPr lvl="2"/>
-            <a:r>
-              <a:rPr lang="en-US"/>
-              <a:t>Third level</a:t>
-            </a:r>
-          </a:p>
-          <a:p>
-            <a:pPr lvl="3"/>
-            <a:r>
-              <a:rPr lang="en-US"/>
-              <a:t>Fourth level</a:t>
-            </a:r>
-          </a:p>
-          <a:p>
-            <a:pPr lvl="4"/>
-            <a:r>
-              <a:rPr lang="en-US"/>
-              <a:t>Fifth level</a:t>
-            </a:r>
-          </a:p>
-        </p:txBody>
-      </p:sp>
-      <p:sp>
-        <p:nvSpPr>
-          <p:cNvPr id="4" name="Content Placeholder 3">
-            <a:extLst>
-              <a:ext uri="{FF2B5EF4-FFF2-40B4-BE49-F238E27FC236}">
-                <a16:creationId xmlns:a16="http://schemas.microsoft.com/office/drawing/2014/main" id="{137F6A5D-0A2A-B8C5-5171-CD24B07ACCF6}"/>
-              </a:ext>
-            </a:extLst>
-          </p:cNvPr>
-          <p:cNvSpPr>
-            <a:spLocks noGrp="1"/>
-          </p:cNvSpPr>
-          <p:nvPr>
-            <p:ph sz="half" idx="2"/>
+          <a:bodyPr anchor="b"/>
+          <a:lstStyle>
+            <a:lvl1pPr algn="ctr">
+              <a:defRPr sz="6000"/>
+            </a:lvl1pPr>
+          </a:lstStyle>
+          <a:p>
+            <a:r>
+              <a:rPr lang="cs-CZ"/>
+              <a:t>Kliknutím lze upravit styl.</a:t>
+            </a:r>
+          </a:p>
+        </p:txBody>
+      </p:sp>
+      <p:sp>
+        <p:nvSpPr>
+          <p:cNvPr id="3" name="Podnadpis 2">
+            <a:extLst>
+              <a:ext uri="{FF2B5EF4-FFF2-40B4-BE49-F238E27FC236}">
+                <a16:creationId xmlns:a16="http://schemas.microsoft.com/office/drawing/2014/main" id="{4F2A63C6-CBDF-96B6-6187-6CE093A95C6E}"/>
+              </a:ext>
+            </a:extLst>
+          </p:cNvPr>
+          <p:cNvSpPr>
+            <a:spLocks noGrp="1"/>
+          </p:cNvSpPr>
+          <p:nvPr>
+            <p:ph type="subTitle" idx="1"/>
           </p:nvPr>
         </p:nvSpPr>
         <p:spPr>
           <a:xfrm>
-            <a:off x="6172200" y="1825625"/>
-            <a:ext cx="5181600" cy="4351338"/>
+            <a:off x="1524000" y="3602038"/>
+            <a:ext cx="9144000" cy="1655762"/>
           </a:xfrm>
         </p:spPr>
         <p:txBody>
           <a:bodyPr/>
-          <a:lstStyle/>
-          <a:p>
-            <a:pPr lvl="0"/>
-            <a:r>
-              <a:rPr lang="en-US"/>
-              <a:t>Click to edit Master text styles</a:t>
-            </a:r>
-          </a:p>
-          <a:p>
-            <a:pPr lvl="1"/>
-            <a:r>
-              <a:rPr lang="en-US"/>
-              <a:t>Second level</a:t>
-            </a:r>
-          </a:p>
-          <a:p>
-            <a:pPr lvl="2"/>
-            <a:r>
-              <a:rPr lang="en-US"/>
-              <a:t>Third level</a:t>
-            </a:r>
-          </a:p>
-          <a:p>
-            <a:pPr lvl="3"/>
-            <a:r>
-              <a:rPr lang="en-US"/>
-              <a:t>Fourth level</a:t>
-            </a:r>
-          </a:p>
-          <a:p>
-            <a:pPr lvl="4"/>
-            <a:r>
-              <a:rPr lang="en-US"/>
-              <a:t>Fifth level</a:t>
-            </a:r>
-          </a:p>
-        </p:txBody>
-      </p:sp>
-      <p:sp>
-        <p:nvSpPr>
-          <p:cNvPr id="5" name="Date Placeholder 4">
-            <a:extLst>
-              <a:ext uri="{FF2B5EF4-FFF2-40B4-BE49-F238E27FC236}">
-                <a16:creationId xmlns:a16="http://schemas.microsoft.com/office/drawing/2014/main" id="{1AAB3F08-3ED3-FC7F-EC13-8269B3F25616}"/>
+          <a:lstStyle>
+            <a:lvl1pPr marL="0" indent="0" algn="ctr">
+              <a:buNone/>
+              <a:defRPr sz="2400"/>
+            </a:lvl1pPr>
+            <a:lvl2pPr marL="457200" indent="0" algn="ctr">
+              <a:buNone/>
+              <a:defRPr sz="2000"/>
+            </a:lvl2pPr>
+            <a:lvl3pPr marL="914400" indent="0" algn="ctr">
+              <a:buNone/>
+              <a:defRPr sz="1800"/>
+            </a:lvl3pPr>
+            <a:lvl4pPr marL="1371600" indent="0" algn="ctr">
+              <a:buNone/>
+              <a:defRPr sz="1600"/>
+            </a:lvl4pPr>
+            <a:lvl5pPr marL="1828800" indent="0" algn="ctr">
+              <a:buNone/>
+              <a:defRPr sz="1600"/>
+            </a:lvl5pPr>
+            <a:lvl6pPr marL="2286000" indent="0" algn="ctr">
+              <a:buNone/>
+              <a:defRPr sz="1600"/>
+            </a:lvl6pPr>
+            <a:lvl7pPr marL="2743200" indent="0" algn="ctr">
+              <a:buNone/>
+              <a:defRPr sz="1600"/>
+            </a:lvl7pPr>
+            <a:lvl8pPr marL="3200400" indent="0" algn="ctr">
+              <a:buNone/>
+              <a:defRPr sz="1600"/>
+            </a:lvl8pPr>
+            <a:lvl9pPr marL="3657600" indent="0" algn="ctr">
+              <a:buNone/>
+              <a:defRPr sz="1600"/>
+            </a:lvl9pPr>
+          </a:lstStyle>
+          <a:p>
+            <a:r>
+              <a:rPr lang="cs-CZ"/>
+              <a:t>Kliknutím můžete upravit styl předlohy.</a:t>
+            </a:r>
+          </a:p>
+        </p:txBody>
+      </p:sp>
+      <p:sp>
+        <p:nvSpPr>
+          <p:cNvPr id="4" name="Zástupný symbol pro datum 3">
+            <a:extLst>
+              <a:ext uri="{FF2B5EF4-FFF2-40B4-BE49-F238E27FC236}">
+                <a16:creationId xmlns:a16="http://schemas.microsoft.com/office/drawing/2014/main" id="{B3275D17-E15A-D0AF-7CDE-2FAACF412A80}"/>
               </a:ext>
             </a:extLst>
           </p:cNvPr>
@@ -299,20 +254,20 @@
           <a:bodyPr/>
           <a:lstStyle/>
           <a:p>
-            <a:fld id="{0018DC77-AFD7-447A-A41B-36AE4CC7F50D}" type="datetimeFigureOut">
-              <a:rPr lang="en-US" smtClean="0"/>
-              <a:t>2/8/2025</a:t>
+            <a:fld id="{6DB30A3A-EBE1-42FC-9BF1-79FFB867F05B}" type="datetimeFigureOut">
+              <a:rPr lang="cs-CZ" smtClean="0"/>
+              <a:t>04.01.2026</a:t>
             </a:fld>
-            <a:endParaRPr lang="en-US"/>
-          </a:p>
-        </p:txBody>
-      </p:sp>
-      <p:sp>
-        <p:nvSpPr>
-          <p:cNvPr id="6" name="Footer Placeholder 5">
-            <a:extLst>
-              <a:ext uri="{FF2B5EF4-FFF2-40B4-BE49-F238E27FC236}">
-                <a16:creationId xmlns:a16="http://schemas.microsoft.com/office/drawing/2014/main" id="{BF31E36A-EA22-845E-BCA6-941FEA121B1B}"/>
+            <a:endParaRPr lang="cs-CZ"/>
+          </a:p>
+        </p:txBody>
+      </p:sp>
+      <p:sp>
+        <p:nvSpPr>
+          <p:cNvPr id="5" name="Zástupný symbol pro zápatí 4">
+            <a:extLst>
+              <a:ext uri="{FF2B5EF4-FFF2-40B4-BE49-F238E27FC236}">
+                <a16:creationId xmlns:a16="http://schemas.microsoft.com/office/drawing/2014/main" id="{C71512C7-516E-6830-68FE-255C1F534558}"/>
               </a:ext>
             </a:extLst>
           </p:cNvPr>
@@ -328,16 +283,16 @@
           <a:bodyPr/>
           <a:lstStyle/>
           <a:p>
-            <a:endParaRPr lang="en-US"/>
-          </a:p>
-        </p:txBody>
-      </p:sp>
-      <p:sp>
-        <p:nvSpPr>
-          <p:cNvPr id="7" name="Slide Number Placeholder 6">
-            <a:extLst>
-              <a:ext uri="{FF2B5EF4-FFF2-40B4-BE49-F238E27FC236}">
-                <a16:creationId xmlns:a16="http://schemas.microsoft.com/office/drawing/2014/main" id="{2C0E60C7-2A57-D1F3-2EEC-CD2FA6BE07EB}"/>
+            <a:endParaRPr lang="cs-CZ"/>
+          </a:p>
+        </p:txBody>
+      </p:sp>
+      <p:sp>
+        <p:nvSpPr>
+          <p:cNvPr id="6" name="Zástupný symbol pro číslo snímku 5">
+            <a:extLst>
+              <a:ext uri="{FF2B5EF4-FFF2-40B4-BE49-F238E27FC236}">
+                <a16:creationId xmlns:a16="http://schemas.microsoft.com/office/drawing/2014/main" id="{7E6EB5AA-9BFF-EE10-49C5-A0F79B1947EF}"/>
               </a:ext>
             </a:extLst>
           </p:cNvPr>
@@ -353,18 +308,18 @@
           <a:bodyPr/>
           <a:lstStyle/>
           <a:p>
-            <a:fld id="{6B2E6DA3-2A58-4FDF-9A98-658FEFDD9C33}" type="slidenum">
-              <a:rPr lang="en-US" smtClean="0"/>
+            <a:fld id="{32129535-2FF0-4674-BDE8-A1FD8B542E18}" type="slidenum">
+              <a:rPr lang="cs-CZ" smtClean="0"/>
               <a:t>‹#›</a:t>
             </a:fld>
-            <a:endParaRPr lang="en-US"/>
+            <a:endParaRPr lang="cs-CZ"/>
           </a:p>
         </p:txBody>
       </p:sp>
     </p:spTree>
     <p:extLst>
       <p:ext uri="{BB962C8B-B14F-4D97-AF65-F5344CB8AC3E}">
-        <p14:creationId xmlns:p14="http://schemas.microsoft.com/office/powerpoint/2010/main" val="896708494"/>
+        <p14:creationId xmlns:p14="http://schemas.microsoft.com/office/powerpoint/2010/main" val="2132743927"/>
       </p:ext>
     </p:extLst>
   </p:cSld>
@@ -376,7 +331,7 @@
 
 <file path=ppt/slideLayouts/slideLayout10.xml><?xml version="1.0" encoding="utf-8"?>
 <p:sldLayout xmlns:a="http://schemas.openxmlformats.org/drawingml/2006/main" xmlns:r="http://schemas.openxmlformats.org/officeDocument/2006/relationships" xmlns:p="http://schemas.openxmlformats.org/presentationml/2006/main" type="vertTx" preserve="1">
-  <p:cSld name="Title and Vertical Text">
+  <p:cSld name="Nadpis a svislý text">
     <p:spTree>
       <p:nvGrpSpPr>
         <p:cNvPr id="1" name=""/>
@@ -393,10 +348,10 @@
       </p:grpSpPr>
       <p:sp>
         <p:nvSpPr>
-          <p:cNvPr id="2" name="Title 1">
-            <a:extLst>
-              <a:ext uri="{FF2B5EF4-FFF2-40B4-BE49-F238E27FC236}">
-                <a16:creationId xmlns:a16="http://schemas.microsoft.com/office/drawing/2014/main" id="{E391ABA0-4811-AA17-265B-2D4E242CD0A5}"/>
+          <p:cNvPr id="2" name="Nadpis 1">
+            <a:extLst>
+              <a:ext uri="{FF2B5EF4-FFF2-40B4-BE49-F238E27FC236}">
+                <a16:creationId xmlns:a16="http://schemas.microsoft.com/office/drawing/2014/main" id="{EF4F161F-F928-DD40-337C-1404E8644BCD}"/>
               </a:ext>
             </a:extLst>
           </p:cNvPr>
@@ -413,18 +368,18 @@
           <a:lstStyle/>
           <a:p>
             <a:r>
-              <a:rPr lang="en-US"/>
-              <a:t>Click to edit Master title style</a:t>
-            </a:r>
-          </a:p>
-        </p:txBody>
-      </p:sp>
-      <p:sp>
-        <p:nvSpPr>
-          <p:cNvPr id="3" name="Vertical Text Placeholder 2">
-            <a:extLst>
-              <a:ext uri="{FF2B5EF4-FFF2-40B4-BE49-F238E27FC236}">
-                <a16:creationId xmlns:a16="http://schemas.microsoft.com/office/drawing/2014/main" id="{503E40FD-193E-D135-10A9-33CC4C599475}"/>
+              <a:rPr lang="cs-CZ"/>
+              <a:t>Kliknutím lze upravit styl.</a:t>
+            </a:r>
+          </a:p>
+        </p:txBody>
+      </p:sp>
+      <p:sp>
+        <p:nvSpPr>
+          <p:cNvPr id="3" name="Zástupný symbol pro svislý text 2">
+            <a:extLst>
+              <a:ext uri="{FF2B5EF4-FFF2-40B4-BE49-F238E27FC236}">
+                <a16:creationId xmlns:a16="http://schemas.microsoft.com/office/drawing/2014/main" id="{E2C25356-0F9B-BE61-3E8D-E9EA44D90E71}"/>
               </a:ext>
             </a:extLst>
           </p:cNvPr>
@@ -442,46 +397,46 @@
           <a:p>
             <a:pPr lvl="0"/>
             <a:r>
-              <a:rPr lang="en-US"/>
-              <a:t>Click to edit Master text styles</a:t>
+              <a:rPr lang="cs-CZ"/>
+              <a:t>Po kliknutí můžete upravovat styly textu v předloze.</a:t>
             </a:r>
           </a:p>
           <a:p>
             <a:pPr lvl="1"/>
             <a:r>
-              <a:rPr lang="en-US"/>
-              <a:t>Second level</a:t>
+              <a:rPr lang="cs-CZ"/>
+              <a:t>Druhá úroveň</a:t>
             </a:r>
           </a:p>
           <a:p>
             <a:pPr lvl="2"/>
             <a:r>
-              <a:rPr lang="en-US"/>
-              <a:t>Third level</a:t>
+              <a:rPr lang="cs-CZ"/>
+              <a:t>Třetí úroveň</a:t>
             </a:r>
           </a:p>
           <a:p>
             <a:pPr lvl="3"/>
             <a:r>
-              <a:rPr lang="en-US"/>
-              <a:t>Fourth level</a:t>
+              <a:rPr lang="cs-CZ"/>
+              <a:t>Čtvrtá úroveň</a:t>
             </a:r>
           </a:p>
           <a:p>
             <a:pPr lvl="4"/>
             <a:r>
-              <a:rPr lang="en-US"/>
-              <a:t>Fifth level</a:t>
-            </a:r>
-          </a:p>
-        </p:txBody>
-      </p:sp>
-      <p:sp>
-        <p:nvSpPr>
-          <p:cNvPr id="4" name="Date Placeholder 3">
-            <a:extLst>
-              <a:ext uri="{FF2B5EF4-FFF2-40B4-BE49-F238E27FC236}">
-                <a16:creationId xmlns:a16="http://schemas.microsoft.com/office/drawing/2014/main" id="{DBC6C95D-7F99-F4BC-0CAC-34271EF356A8}"/>
+              <a:rPr lang="cs-CZ"/>
+              <a:t>Pátá úroveň</a:t>
+            </a:r>
+          </a:p>
+        </p:txBody>
+      </p:sp>
+      <p:sp>
+        <p:nvSpPr>
+          <p:cNvPr id="4" name="Zástupný symbol pro datum 3">
+            <a:extLst>
+              <a:ext uri="{FF2B5EF4-FFF2-40B4-BE49-F238E27FC236}">
+                <a16:creationId xmlns:a16="http://schemas.microsoft.com/office/drawing/2014/main" id="{14452FC7-B81D-642B-D431-47639EFB8AED}"/>
               </a:ext>
             </a:extLst>
           </p:cNvPr>
@@ -497,20 +452,20 @@
           <a:bodyPr/>
           <a:lstStyle/>
           <a:p>
-            <a:fld id="{0018DC77-AFD7-447A-A41B-36AE4CC7F50D}" type="datetimeFigureOut">
-              <a:rPr lang="en-US" smtClean="0"/>
-              <a:t>2/8/2025</a:t>
+            <a:fld id="{6DB30A3A-EBE1-42FC-9BF1-79FFB867F05B}" type="datetimeFigureOut">
+              <a:rPr lang="cs-CZ" smtClean="0"/>
+              <a:t>04.01.2026</a:t>
             </a:fld>
-            <a:endParaRPr lang="en-US"/>
-          </a:p>
-        </p:txBody>
-      </p:sp>
-      <p:sp>
-        <p:nvSpPr>
-          <p:cNvPr id="5" name="Footer Placeholder 4">
-            <a:extLst>
-              <a:ext uri="{FF2B5EF4-FFF2-40B4-BE49-F238E27FC236}">
-                <a16:creationId xmlns:a16="http://schemas.microsoft.com/office/drawing/2014/main" id="{17AC24CB-5303-2B6C-27C4-F77C22EB0246}"/>
+            <a:endParaRPr lang="cs-CZ"/>
+          </a:p>
+        </p:txBody>
+      </p:sp>
+      <p:sp>
+        <p:nvSpPr>
+          <p:cNvPr id="5" name="Zástupný symbol pro zápatí 4">
+            <a:extLst>
+              <a:ext uri="{FF2B5EF4-FFF2-40B4-BE49-F238E27FC236}">
+                <a16:creationId xmlns:a16="http://schemas.microsoft.com/office/drawing/2014/main" id="{C12EF5B7-1A28-BABD-6288-B25EC6F20037}"/>
               </a:ext>
             </a:extLst>
           </p:cNvPr>
@@ -526,16 +481,16 @@
           <a:bodyPr/>
           <a:lstStyle/>
           <a:p>
-            <a:endParaRPr lang="en-US"/>
-          </a:p>
-        </p:txBody>
-      </p:sp>
-      <p:sp>
-        <p:nvSpPr>
-          <p:cNvPr id="6" name="Slide Number Placeholder 5">
-            <a:extLst>
-              <a:ext uri="{FF2B5EF4-FFF2-40B4-BE49-F238E27FC236}">
-                <a16:creationId xmlns:a16="http://schemas.microsoft.com/office/drawing/2014/main" id="{48A84854-2825-AC09-00BA-B8F9C37FF775}"/>
+            <a:endParaRPr lang="cs-CZ"/>
+          </a:p>
+        </p:txBody>
+      </p:sp>
+      <p:sp>
+        <p:nvSpPr>
+          <p:cNvPr id="6" name="Zástupný symbol pro číslo snímku 5">
+            <a:extLst>
+              <a:ext uri="{FF2B5EF4-FFF2-40B4-BE49-F238E27FC236}">
+                <a16:creationId xmlns:a16="http://schemas.microsoft.com/office/drawing/2014/main" id="{AE6BB4E7-35E3-611C-DE39-7BD7FF14A8C2}"/>
               </a:ext>
             </a:extLst>
           </p:cNvPr>
@@ -551,18 +506,18 @@
           <a:bodyPr/>
           <a:lstStyle/>
           <a:p>
-            <a:fld id="{6B2E6DA3-2A58-4FDF-9A98-658FEFDD9C33}" type="slidenum">
-              <a:rPr lang="en-US" smtClean="0"/>
+            <a:fld id="{32129535-2FF0-4674-BDE8-A1FD8B542E18}" type="slidenum">
+              <a:rPr lang="cs-CZ" smtClean="0"/>
               <a:t>‹#›</a:t>
             </a:fld>
-            <a:endParaRPr lang="en-US"/>
+            <a:endParaRPr lang="cs-CZ"/>
           </a:p>
         </p:txBody>
       </p:sp>
     </p:spTree>
     <p:extLst>
       <p:ext uri="{BB962C8B-B14F-4D97-AF65-F5344CB8AC3E}">
-        <p14:creationId xmlns:p14="http://schemas.microsoft.com/office/powerpoint/2010/main" val="4040548488"/>
+        <p14:creationId xmlns:p14="http://schemas.microsoft.com/office/powerpoint/2010/main" val="86714070"/>
       </p:ext>
     </p:extLst>
   </p:cSld>
@@ -574,7 +529,7 @@
 
 <file path=ppt/slideLayouts/slideLayout11.xml><?xml version="1.0" encoding="utf-8"?>
 <p:sldLayout xmlns:a="http://schemas.openxmlformats.org/drawingml/2006/main" xmlns:r="http://schemas.openxmlformats.org/officeDocument/2006/relationships" xmlns:p="http://schemas.openxmlformats.org/presentationml/2006/main" type="vertTitleAndTx" preserve="1">
-  <p:cSld name="Vertical Title and Text">
+  <p:cSld name="Svislý nadpis a text">
     <p:spTree>
       <p:nvGrpSpPr>
         <p:cNvPr id="1" name=""/>
@@ -591,10 +546,10 @@
       </p:grpSpPr>
       <p:sp>
         <p:nvSpPr>
-          <p:cNvPr id="2" name="Vertical Title 1">
-            <a:extLst>
-              <a:ext uri="{FF2B5EF4-FFF2-40B4-BE49-F238E27FC236}">
-                <a16:creationId xmlns:a16="http://schemas.microsoft.com/office/drawing/2014/main" id="{89DFD0B7-A5E2-4D37-0BE2-759BD090F928}"/>
+          <p:cNvPr id="2" name="Svislý nadpis 1">
+            <a:extLst>
+              <a:ext uri="{FF2B5EF4-FFF2-40B4-BE49-F238E27FC236}">
+                <a16:creationId xmlns:a16="http://schemas.microsoft.com/office/drawing/2014/main" id="{50A68859-1C83-3909-D96B-CE3EA3ECFC16}"/>
               </a:ext>
             </a:extLst>
           </p:cNvPr>
@@ -616,18 +571,18 @@
           <a:lstStyle/>
           <a:p>
             <a:r>
-              <a:rPr lang="en-US"/>
-              <a:t>Click to edit Master title style</a:t>
-            </a:r>
-          </a:p>
-        </p:txBody>
-      </p:sp>
-      <p:sp>
-        <p:nvSpPr>
-          <p:cNvPr id="3" name="Vertical Text Placeholder 2">
-            <a:extLst>
-              <a:ext uri="{FF2B5EF4-FFF2-40B4-BE49-F238E27FC236}">
-                <a16:creationId xmlns:a16="http://schemas.microsoft.com/office/drawing/2014/main" id="{777F3D11-967E-4DB2-4D38-87D0350B7DA7}"/>
+              <a:rPr lang="cs-CZ"/>
+              <a:t>Kliknutím lze upravit styl.</a:t>
+            </a:r>
+          </a:p>
+        </p:txBody>
+      </p:sp>
+      <p:sp>
+        <p:nvSpPr>
+          <p:cNvPr id="3" name="Zástupný symbol pro svislý text 2">
+            <a:extLst>
+              <a:ext uri="{FF2B5EF4-FFF2-40B4-BE49-F238E27FC236}">
+                <a16:creationId xmlns:a16="http://schemas.microsoft.com/office/drawing/2014/main" id="{F3C31C7C-0910-F31C-40B5-C2A196BC7656}"/>
               </a:ext>
             </a:extLst>
           </p:cNvPr>
@@ -650,46 +605,46 @@
           <a:p>
             <a:pPr lvl="0"/>
             <a:r>
-              <a:rPr lang="en-US"/>
-              <a:t>Click to edit Master text styles</a:t>
+              <a:rPr lang="cs-CZ"/>
+              <a:t>Po kliknutí můžete upravovat styly textu v předloze.</a:t>
             </a:r>
           </a:p>
           <a:p>
             <a:pPr lvl="1"/>
             <a:r>
-              <a:rPr lang="en-US"/>
-              <a:t>Second level</a:t>
+              <a:rPr lang="cs-CZ"/>
+              <a:t>Druhá úroveň</a:t>
             </a:r>
           </a:p>
           <a:p>
             <a:pPr lvl="2"/>
             <a:r>
-              <a:rPr lang="en-US"/>
-              <a:t>Third level</a:t>
+              <a:rPr lang="cs-CZ"/>
+              <a:t>Třetí úroveň</a:t>
             </a:r>
           </a:p>
           <a:p>
             <a:pPr lvl="3"/>
             <a:r>
-              <a:rPr lang="en-US"/>
-              <a:t>Fourth level</a:t>
+              <a:rPr lang="cs-CZ"/>
+              <a:t>Čtvrtá úroveň</a:t>
             </a:r>
           </a:p>
           <a:p>
             <a:pPr lvl="4"/>
             <a:r>
-              <a:rPr lang="en-US"/>
-              <a:t>Fifth level</a:t>
-            </a:r>
-          </a:p>
-        </p:txBody>
-      </p:sp>
-      <p:sp>
-        <p:nvSpPr>
-          <p:cNvPr id="4" name="Date Placeholder 3">
-            <a:extLst>
-              <a:ext uri="{FF2B5EF4-FFF2-40B4-BE49-F238E27FC236}">
-                <a16:creationId xmlns:a16="http://schemas.microsoft.com/office/drawing/2014/main" id="{A15B34F9-59D0-47A8-65E3-590942B5F0C0}"/>
+              <a:rPr lang="cs-CZ"/>
+              <a:t>Pátá úroveň</a:t>
+            </a:r>
+          </a:p>
+        </p:txBody>
+      </p:sp>
+      <p:sp>
+        <p:nvSpPr>
+          <p:cNvPr id="4" name="Zástupný symbol pro datum 3">
+            <a:extLst>
+              <a:ext uri="{FF2B5EF4-FFF2-40B4-BE49-F238E27FC236}">
+                <a16:creationId xmlns:a16="http://schemas.microsoft.com/office/drawing/2014/main" id="{8F96D16E-A715-1602-776E-80DCA572C8D4}"/>
               </a:ext>
             </a:extLst>
           </p:cNvPr>
@@ -705,20 +660,20 @@
           <a:bodyPr/>
           <a:lstStyle/>
           <a:p>
-            <a:fld id="{0018DC77-AFD7-447A-A41B-36AE4CC7F50D}" type="datetimeFigureOut">
-              <a:rPr lang="en-US" smtClean="0"/>
-              <a:t>2/8/2025</a:t>
+            <a:fld id="{6DB30A3A-EBE1-42FC-9BF1-79FFB867F05B}" type="datetimeFigureOut">
+              <a:rPr lang="cs-CZ" smtClean="0"/>
+              <a:t>04.01.2026</a:t>
             </a:fld>
-            <a:endParaRPr lang="en-US"/>
-          </a:p>
-        </p:txBody>
-      </p:sp>
-      <p:sp>
-        <p:nvSpPr>
-          <p:cNvPr id="5" name="Footer Placeholder 4">
-            <a:extLst>
-              <a:ext uri="{FF2B5EF4-FFF2-40B4-BE49-F238E27FC236}">
-                <a16:creationId xmlns:a16="http://schemas.microsoft.com/office/drawing/2014/main" id="{BA67FCA3-50BA-DBAF-A025-1CE591E77F09}"/>
+            <a:endParaRPr lang="cs-CZ"/>
+          </a:p>
+        </p:txBody>
+      </p:sp>
+      <p:sp>
+        <p:nvSpPr>
+          <p:cNvPr id="5" name="Zástupný symbol pro zápatí 4">
+            <a:extLst>
+              <a:ext uri="{FF2B5EF4-FFF2-40B4-BE49-F238E27FC236}">
+                <a16:creationId xmlns:a16="http://schemas.microsoft.com/office/drawing/2014/main" id="{F09AF8AB-DA62-17DF-AEC4-990F57A8D743}"/>
               </a:ext>
             </a:extLst>
           </p:cNvPr>
@@ -734,16 +689,16 @@
           <a:bodyPr/>
           <a:lstStyle/>
           <a:p>
-            <a:endParaRPr lang="en-US"/>
-          </a:p>
-        </p:txBody>
-      </p:sp>
-      <p:sp>
-        <p:nvSpPr>
-          <p:cNvPr id="6" name="Slide Number Placeholder 5">
-            <a:extLst>
-              <a:ext uri="{FF2B5EF4-FFF2-40B4-BE49-F238E27FC236}">
-                <a16:creationId xmlns:a16="http://schemas.microsoft.com/office/drawing/2014/main" id="{C0E7C3E5-53C2-835F-4D6C-172500D574A2}"/>
+            <a:endParaRPr lang="cs-CZ"/>
+          </a:p>
+        </p:txBody>
+      </p:sp>
+      <p:sp>
+        <p:nvSpPr>
+          <p:cNvPr id="6" name="Zástupný symbol pro číslo snímku 5">
+            <a:extLst>
+              <a:ext uri="{FF2B5EF4-FFF2-40B4-BE49-F238E27FC236}">
+                <a16:creationId xmlns:a16="http://schemas.microsoft.com/office/drawing/2014/main" id="{A614372B-E392-D425-2CAB-A15C6E031823}"/>
               </a:ext>
             </a:extLst>
           </p:cNvPr>
@@ -759,18 +714,18 @@
           <a:bodyPr/>
           <a:lstStyle/>
           <a:p>
-            <a:fld id="{6B2E6DA3-2A58-4FDF-9A98-658FEFDD9C33}" type="slidenum">
-              <a:rPr lang="en-US" smtClean="0"/>
+            <a:fld id="{32129535-2FF0-4674-BDE8-A1FD8B542E18}" type="slidenum">
+              <a:rPr lang="cs-CZ" smtClean="0"/>
               <a:t>‹#›</a:t>
             </a:fld>
-            <a:endParaRPr lang="en-US"/>
+            <a:endParaRPr lang="cs-CZ"/>
           </a:p>
         </p:txBody>
       </p:sp>
     </p:spTree>
     <p:extLst>
       <p:ext uri="{BB962C8B-B14F-4D97-AF65-F5344CB8AC3E}">
-        <p14:creationId xmlns:p14="http://schemas.microsoft.com/office/powerpoint/2010/main" val="1614909131"/>
+        <p14:creationId xmlns:p14="http://schemas.microsoft.com/office/powerpoint/2010/main" val="2717275051"/>
       </p:ext>
     </p:extLst>
   </p:cSld>
@@ -781,8 +736,8 @@
 </file>
 
 <file path=ppt/slideLayouts/slideLayout2.xml><?xml version="1.0" encoding="utf-8"?>
-<p:sldLayout xmlns:a="http://schemas.openxmlformats.org/drawingml/2006/main" xmlns:r="http://schemas.openxmlformats.org/officeDocument/2006/relationships" xmlns:p="http://schemas.openxmlformats.org/presentationml/2006/main" type="twoTxTwoObj" preserve="1">
-  <p:cSld name="Comparison">
+<p:sldLayout xmlns:a="http://schemas.openxmlformats.org/drawingml/2006/main" xmlns:r="http://schemas.openxmlformats.org/officeDocument/2006/relationships" xmlns:p="http://schemas.openxmlformats.org/presentationml/2006/main" type="obj" preserve="1">
+  <p:cSld name="Nadpis a obsah">
     <p:spTree>
       <p:nvGrpSpPr>
         <p:cNvPr id="1" name=""/>
@@ -799,10 +754,10 @@
       </p:grpSpPr>
       <p:sp>
         <p:nvSpPr>
-          <p:cNvPr id="2" name="Title 1">
-            <a:extLst>
-              <a:ext uri="{FF2B5EF4-FFF2-40B4-BE49-F238E27FC236}">
-                <a16:creationId xmlns:a16="http://schemas.microsoft.com/office/drawing/2014/main" id="{80DC1578-697E-59AC-7222-9576E756E111}"/>
+          <p:cNvPr id="2" name="Nadpis 1">
+            <a:extLst>
+              <a:ext uri="{FF2B5EF4-FFF2-40B4-BE49-F238E27FC236}">
+                <a16:creationId xmlns:a16="http://schemas.microsoft.com/office/drawing/2014/main" id="{CD77BAAD-F418-4C55-8870-B456CB640B23}"/>
               </a:ext>
             </a:extLst>
           </p:cNvPr>
@@ -813,295 +768,81 @@
             <p:ph type="title"/>
           </p:nvPr>
         </p:nvSpPr>
-        <p:spPr>
-          <a:xfrm>
-            <a:off x="839788" y="365125"/>
-            <a:ext cx="10515600" cy="1325563"/>
-          </a:xfrm>
-        </p:spPr>
-        <p:txBody>
-          <a:bodyPr/>
-          <a:lstStyle/>
-          <a:p>
-            <a:r>
-              <a:rPr lang="en-US"/>
-              <a:t>Click to edit Master title style</a:t>
-            </a:r>
-          </a:p>
-        </p:txBody>
-      </p:sp>
-      <p:sp>
-        <p:nvSpPr>
-          <p:cNvPr id="3" name="Text Placeholder 2">
-            <a:extLst>
-              <a:ext uri="{FF2B5EF4-FFF2-40B4-BE49-F238E27FC236}">
-                <a16:creationId xmlns:a16="http://schemas.microsoft.com/office/drawing/2014/main" id="{EAC76244-A446-E6CC-C13D-9C6BE2350188}"/>
-              </a:ext>
-            </a:extLst>
-          </p:cNvPr>
-          <p:cNvSpPr>
-            <a:spLocks noGrp="1"/>
-          </p:cNvSpPr>
-          <p:nvPr>
-            <p:ph type="body" idx="1"/>
-          </p:nvPr>
-        </p:nvSpPr>
-        <p:spPr>
-          <a:xfrm>
-            <a:off x="839788" y="1681163"/>
-            <a:ext cx="5157787" cy="823912"/>
-          </a:xfrm>
-        </p:spPr>
-        <p:txBody>
-          <a:bodyPr anchor="b"/>
-          <a:lstStyle>
-            <a:lvl1pPr marL="0" indent="0">
-              <a:buNone/>
-              <a:defRPr sz="2400" b="1"/>
-            </a:lvl1pPr>
-            <a:lvl2pPr marL="457200" indent="0">
-              <a:buNone/>
-              <a:defRPr sz="2000" b="1"/>
-            </a:lvl2pPr>
-            <a:lvl3pPr marL="914400" indent="0">
-              <a:buNone/>
-              <a:defRPr sz="1800" b="1"/>
-            </a:lvl3pPr>
-            <a:lvl4pPr marL="1371600" indent="0">
-              <a:buNone/>
-              <a:defRPr sz="1600" b="1"/>
-            </a:lvl4pPr>
-            <a:lvl5pPr marL="1828800" indent="0">
-              <a:buNone/>
-              <a:defRPr sz="1600" b="1"/>
-            </a:lvl5pPr>
-            <a:lvl6pPr marL="2286000" indent="0">
-              <a:buNone/>
-              <a:defRPr sz="1600" b="1"/>
-            </a:lvl6pPr>
-            <a:lvl7pPr marL="2743200" indent="0">
-              <a:buNone/>
-              <a:defRPr sz="1600" b="1"/>
-            </a:lvl7pPr>
-            <a:lvl8pPr marL="3200400" indent="0">
-              <a:buNone/>
-              <a:defRPr sz="1600" b="1"/>
-            </a:lvl8pPr>
-            <a:lvl9pPr marL="3657600" indent="0">
-              <a:buNone/>
-              <a:defRPr sz="1600" b="1"/>
-            </a:lvl9pPr>
-          </a:lstStyle>
+        <p:spPr/>
+        <p:txBody>
+          <a:bodyPr/>
+          <a:lstStyle/>
+          <a:p>
+            <a:r>
+              <a:rPr lang="cs-CZ"/>
+              <a:t>Kliknutím lze upravit styl.</a:t>
+            </a:r>
+          </a:p>
+        </p:txBody>
+      </p:sp>
+      <p:sp>
+        <p:nvSpPr>
+          <p:cNvPr id="3" name="Zástupný obsah 2">
+            <a:extLst>
+              <a:ext uri="{FF2B5EF4-FFF2-40B4-BE49-F238E27FC236}">
+                <a16:creationId xmlns:a16="http://schemas.microsoft.com/office/drawing/2014/main" id="{789EB251-223B-E4DD-47B0-A665D052AB48}"/>
+              </a:ext>
+            </a:extLst>
+          </p:cNvPr>
+          <p:cNvSpPr>
+            <a:spLocks noGrp="1"/>
+          </p:cNvSpPr>
+          <p:nvPr>
+            <p:ph idx="1"/>
+          </p:nvPr>
+        </p:nvSpPr>
+        <p:spPr/>
+        <p:txBody>
+          <a:bodyPr/>
+          <a:lstStyle/>
           <a:p>
             <a:pPr lvl="0"/>
             <a:r>
-              <a:rPr lang="en-US"/>
-              <a:t>Click to edit Master text styles</a:t>
-            </a:r>
-          </a:p>
-        </p:txBody>
-      </p:sp>
-      <p:sp>
-        <p:nvSpPr>
-          <p:cNvPr id="4" name="Content Placeholder 3">
-            <a:extLst>
-              <a:ext uri="{FF2B5EF4-FFF2-40B4-BE49-F238E27FC236}">
-                <a16:creationId xmlns:a16="http://schemas.microsoft.com/office/drawing/2014/main" id="{B4269991-6074-1531-B68A-073914ACF80B}"/>
-              </a:ext>
-            </a:extLst>
-          </p:cNvPr>
-          <p:cNvSpPr>
-            <a:spLocks noGrp="1"/>
-          </p:cNvSpPr>
-          <p:nvPr>
-            <p:ph sz="half" idx="2"/>
-          </p:nvPr>
-        </p:nvSpPr>
-        <p:spPr>
-          <a:xfrm>
-            <a:off x="839788" y="2505075"/>
-            <a:ext cx="5157787" cy="3684588"/>
-          </a:xfrm>
-        </p:spPr>
-        <p:txBody>
-          <a:bodyPr/>
-          <a:lstStyle/>
-          <a:p>
-            <a:pPr lvl="0"/>
-            <a:r>
-              <a:rPr lang="en-US"/>
-              <a:t>Click to edit Master text styles</a:t>
+              <a:rPr lang="cs-CZ"/>
+              <a:t>Po kliknutí můžete upravovat styly textu v předloze.</a:t>
             </a:r>
           </a:p>
           <a:p>
             <a:pPr lvl="1"/>
             <a:r>
-              <a:rPr lang="en-US"/>
-              <a:t>Second level</a:t>
+              <a:rPr lang="cs-CZ"/>
+              <a:t>Druhá úroveň</a:t>
             </a:r>
           </a:p>
           <a:p>
             <a:pPr lvl="2"/>
             <a:r>
-              <a:rPr lang="en-US"/>
-              <a:t>Third level</a:t>
+              <a:rPr lang="cs-CZ"/>
+              <a:t>Třetí úroveň</a:t>
             </a:r>
           </a:p>
           <a:p>
             <a:pPr lvl="3"/>
             <a:r>
-              <a:rPr lang="en-US"/>
-              <a:t>Fourth level</a:t>
+              <a:rPr lang="cs-CZ"/>
+              <a:t>Čtvrtá úroveň</a:t>
             </a:r>
           </a:p>
           <a:p>
             <a:pPr lvl="4"/>
             <a:r>
-              <a:rPr lang="en-US"/>
-              <a:t>Fifth level</a:t>
-            </a:r>
-          </a:p>
-        </p:txBody>
-      </p:sp>
-      <p:sp>
-        <p:nvSpPr>
-          <p:cNvPr id="5" name="Text Placeholder 4">
-            <a:extLst>
-              <a:ext uri="{FF2B5EF4-FFF2-40B4-BE49-F238E27FC236}">
-                <a16:creationId xmlns:a16="http://schemas.microsoft.com/office/drawing/2014/main" id="{7E1A119D-F049-3B6A-FECC-FC12ECEF95F2}"/>
-              </a:ext>
-            </a:extLst>
-          </p:cNvPr>
-          <p:cNvSpPr>
-            <a:spLocks noGrp="1"/>
-          </p:cNvSpPr>
-          <p:nvPr>
-            <p:ph type="body" sz="quarter" idx="3"/>
-          </p:nvPr>
-        </p:nvSpPr>
-        <p:spPr>
-          <a:xfrm>
-            <a:off x="6172200" y="1681163"/>
-            <a:ext cx="5183188" cy="823912"/>
-          </a:xfrm>
-        </p:spPr>
-        <p:txBody>
-          <a:bodyPr anchor="b"/>
-          <a:lstStyle>
-            <a:lvl1pPr marL="0" indent="0">
-              <a:buNone/>
-              <a:defRPr sz="2400" b="1"/>
-            </a:lvl1pPr>
-            <a:lvl2pPr marL="457200" indent="0">
-              <a:buNone/>
-              <a:defRPr sz="2000" b="1"/>
-            </a:lvl2pPr>
-            <a:lvl3pPr marL="914400" indent="0">
-              <a:buNone/>
-              <a:defRPr sz="1800" b="1"/>
-            </a:lvl3pPr>
-            <a:lvl4pPr marL="1371600" indent="0">
-              <a:buNone/>
-              <a:defRPr sz="1600" b="1"/>
-            </a:lvl4pPr>
-            <a:lvl5pPr marL="1828800" indent="0">
-              <a:buNone/>
-              <a:defRPr sz="1600" b="1"/>
-            </a:lvl5pPr>
-            <a:lvl6pPr marL="2286000" indent="0">
-              <a:buNone/>
-              <a:defRPr sz="1600" b="1"/>
-            </a:lvl6pPr>
-            <a:lvl7pPr marL="2743200" indent="0">
-              <a:buNone/>
-              <a:defRPr sz="1600" b="1"/>
-            </a:lvl7pPr>
-            <a:lvl8pPr marL="3200400" indent="0">
-              <a:buNone/>
-              <a:defRPr sz="1600" b="1"/>
-            </a:lvl8pPr>
-            <a:lvl9pPr marL="3657600" indent="0">
-              <a:buNone/>
-              <a:defRPr sz="1600" b="1"/>
-            </a:lvl9pPr>
-          </a:lstStyle>
-          <a:p>
-            <a:pPr lvl="0"/>
-            <a:r>
-              <a:rPr lang="en-US"/>
-              <a:t>Click to edit Master text styles</a:t>
-            </a:r>
-          </a:p>
-        </p:txBody>
-      </p:sp>
-      <p:sp>
-        <p:nvSpPr>
-          <p:cNvPr id="6" name="Content Placeholder 5">
-            <a:extLst>
-              <a:ext uri="{FF2B5EF4-FFF2-40B4-BE49-F238E27FC236}">
-                <a16:creationId xmlns:a16="http://schemas.microsoft.com/office/drawing/2014/main" id="{BD10E6EA-F3F7-B3DB-6646-C8674438DA11}"/>
-              </a:ext>
-            </a:extLst>
-          </p:cNvPr>
-          <p:cNvSpPr>
-            <a:spLocks noGrp="1"/>
-          </p:cNvSpPr>
-          <p:nvPr>
-            <p:ph sz="quarter" idx="4"/>
-          </p:nvPr>
-        </p:nvSpPr>
-        <p:spPr>
-          <a:xfrm>
-            <a:off x="6172200" y="2505075"/>
-            <a:ext cx="5183188" cy="3684588"/>
-          </a:xfrm>
-        </p:spPr>
-        <p:txBody>
-          <a:bodyPr/>
-          <a:lstStyle/>
-          <a:p>
-            <a:pPr lvl="0"/>
-            <a:r>
-              <a:rPr lang="en-US"/>
-              <a:t>Click to edit Master text styles</a:t>
-            </a:r>
-          </a:p>
-          <a:p>
-            <a:pPr lvl="1"/>
-            <a:r>
-              <a:rPr lang="en-US"/>
-              <a:t>Second level</a:t>
-            </a:r>
-          </a:p>
-          <a:p>
-            <a:pPr lvl="2"/>
-            <a:r>
-              <a:rPr lang="en-US"/>
-              <a:t>Third level</a:t>
-            </a:r>
-          </a:p>
-          <a:p>
-            <a:pPr lvl="3"/>
-            <a:r>
-              <a:rPr lang="en-US"/>
-              <a:t>Fourth level</a:t>
-            </a:r>
-          </a:p>
-          <a:p>
-            <a:pPr lvl="4"/>
-            <a:r>
-              <a:rPr lang="en-US"/>
-              <a:t>Fifth level</a:t>
-            </a:r>
-          </a:p>
-        </p:txBody>
-      </p:sp>
-      <p:sp>
-        <p:nvSpPr>
-          <p:cNvPr id="7" name="Date Placeholder 6">
-            <a:extLst>
-              <a:ext uri="{FF2B5EF4-FFF2-40B4-BE49-F238E27FC236}">
-                <a16:creationId xmlns:a16="http://schemas.microsoft.com/office/drawing/2014/main" id="{DB788B15-1712-A423-7FE8-F62554AB5E19}"/>
+              <a:rPr lang="cs-CZ"/>
+              <a:t>Pátá úroveň</a:t>
+            </a:r>
+          </a:p>
+        </p:txBody>
+      </p:sp>
+      <p:sp>
+        <p:nvSpPr>
+          <p:cNvPr id="4" name="Zástupný symbol pro datum 3">
+            <a:extLst>
+              <a:ext uri="{FF2B5EF4-FFF2-40B4-BE49-F238E27FC236}">
+                <a16:creationId xmlns:a16="http://schemas.microsoft.com/office/drawing/2014/main" id="{E6B34B51-B856-A1F2-7A44-123388670271}"/>
               </a:ext>
             </a:extLst>
           </p:cNvPr>
@@ -1117,20 +858,20 @@
           <a:bodyPr/>
           <a:lstStyle/>
           <a:p>
-            <a:fld id="{0018DC77-AFD7-447A-A41B-36AE4CC7F50D}" type="datetimeFigureOut">
-              <a:rPr lang="en-US" smtClean="0"/>
-              <a:t>2/8/2025</a:t>
+            <a:fld id="{6DB30A3A-EBE1-42FC-9BF1-79FFB867F05B}" type="datetimeFigureOut">
+              <a:rPr lang="cs-CZ" smtClean="0"/>
+              <a:t>04.01.2026</a:t>
             </a:fld>
-            <a:endParaRPr lang="en-US"/>
-          </a:p>
-        </p:txBody>
-      </p:sp>
-      <p:sp>
-        <p:nvSpPr>
-          <p:cNvPr id="8" name="Footer Placeholder 7">
-            <a:extLst>
-              <a:ext uri="{FF2B5EF4-FFF2-40B4-BE49-F238E27FC236}">
-                <a16:creationId xmlns:a16="http://schemas.microsoft.com/office/drawing/2014/main" id="{08EC4A8E-C7CF-D60A-5CB7-C5938688DB0C}"/>
+            <a:endParaRPr lang="cs-CZ"/>
+          </a:p>
+        </p:txBody>
+      </p:sp>
+      <p:sp>
+        <p:nvSpPr>
+          <p:cNvPr id="5" name="Zástupný symbol pro zápatí 4">
+            <a:extLst>
+              <a:ext uri="{FF2B5EF4-FFF2-40B4-BE49-F238E27FC236}">
+                <a16:creationId xmlns:a16="http://schemas.microsoft.com/office/drawing/2014/main" id="{5007AA14-1498-45B3-0C07-2DF0807D7FFF}"/>
               </a:ext>
             </a:extLst>
           </p:cNvPr>
@@ -1146,16 +887,16 @@
           <a:bodyPr/>
           <a:lstStyle/>
           <a:p>
-            <a:endParaRPr lang="en-US"/>
-          </a:p>
-        </p:txBody>
-      </p:sp>
-      <p:sp>
-        <p:nvSpPr>
-          <p:cNvPr id="9" name="Slide Number Placeholder 8">
-            <a:extLst>
-              <a:ext uri="{FF2B5EF4-FFF2-40B4-BE49-F238E27FC236}">
-                <a16:creationId xmlns:a16="http://schemas.microsoft.com/office/drawing/2014/main" id="{D61FD0DB-7E96-161F-737F-C29E6467E20B}"/>
+            <a:endParaRPr lang="cs-CZ"/>
+          </a:p>
+        </p:txBody>
+      </p:sp>
+      <p:sp>
+        <p:nvSpPr>
+          <p:cNvPr id="6" name="Zástupný symbol pro číslo snímku 5">
+            <a:extLst>
+              <a:ext uri="{FF2B5EF4-FFF2-40B4-BE49-F238E27FC236}">
+                <a16:creationId xmlns:a16="http://schemas.microsoft.com/office/drawing/2014/main" id="{B10C34EA-F227-4254-3610-FC757DF3EFB3}"/>
               </a:ext>
             </a:extLst>
           </p:cNvPr>
@@ -1171,18 +912,18 @@
           <a:bodyPr/>
           <a:lstStyle/>
           <a:p>
-            <a:fld id="{6B2E6DA3-2A58-4FDF-9A98-658FEFDD9C33}" type="slidenum">
-              <a:rPr lang="en-US" smtClean="0"/>
+            <a:fld id="{32129535-2FF0-4674-BDE8-A1FD8B542E18}" type="slidenum">
+              <a:rPr lang="cs-CZ" smtClean="0"/>
               <a:t>‹#›</a:t>
             </a:fld>
-            <a:endParaRPr lang="en-US"/>
+            <a:endParaRPr lang="cs-CZ"/>
           </a:p>
         </p:txBody>
       </p:sp>
     </p:spTree>
     <p:extLst>
       <p:ext uri="{BB962C8B-B14F-4D97-AF65-F5344CB8AC3E}">
-        <p14:creationId xmlns:p14="http://schemas.microsoft.com/office/powerpoint/2010/main" val="2877149352"/>
+        <p14:creationId xmlns:p14="http://schemas.microsoft.com/office/powerpoint/2010/main" val="899417177"/>
       </p:ext>
     </p:extLst>
   </p:cSld>
@@ -1193,8 +934,8 @@
 </file>
 
 <file path=ppt/slideLayouts/slideLayout3.xml><?xml version="1.0" encoding="utf-8"?>
-<p:sldLayout xmlns:a="http://schemas.openxmlformats.org/drawingml/2006/main" xmlns:r="http://schemas.openxmlformats.org/officeDocument/2006/relationships" xmlns:p="http://schemas.openxmlformats.org/presentationml/2006/main" type="title" preserve="1">
-  <p:cSld name="Title Slide">
+<p:sldLayout xmlns:a="http://schemas.openxmlformats.org/drawingml/2006/main" xmlns:r="http://schemas.openxmlformats.org/officeDocument/2006/relationships" xmlns:p="http://schemas.openxmlformats.org/presentationml/2006/main" type="secHead" preserve="1">
+  <p:cSld name="Záhlaví oddílu">
     <p:spTree>
       <p:nvGrpSpPr>
         <p:cNvPr id="1" name=""/>
@@ -1211,117 +952,172 @@
       </p:grpSpPr>
       <p:sp>
         <p:nvSpPr>
-          <p:cNvPr id="2" name="Title 1">
-            <a:extLst>
-              <a:ext uri="{FF2B5EF4-FFF2-40B4-BE49-F238E27FC236}">
-                <a16:creationId xmlns:a16="http://schemas.microsoft.com/office/drawing/2014/main" id="{BFFAD45B-03C1-FCFC-04A2-BF09C3F2AC2B}"/>
-              </a:ext>
-            </a:extLst>
-          </p:cNvPr>
-          <p:cNvSpPr>
-            <a:spLocks noGrp="1"/>
-          </p:cNvSpPr>
-          <p:nvPr>
-            <p:ph type="ctrTitle"/>
+          <p:cNvPr id="2" name="Nadpis 1">
+            <a:extLst>
+              <a:ext uri="{FF2B5EF4-FFF2-40B4-BE49-F238E27FC236}">
+                <a16:creationId xmlns:a16="http://schemas.microsoft.com/office/drawing/2014/main" id="{95FA2819-155C-6A1F-F3D8-907E55B1C005}"/>
+              </a:ext>
+            </a:extLst>
+          </p:cNvPr>
+          <p:cNvSpPr>
+            <a:spLocks noGrp="1"/>
+          </p:cNvSpPr>
+          <p:nvPr>
+            <p:ph type="title"/>
           </p:nvPr>
         </p:nvSpPr>
         <p:spPr>
           <a:xfrm>
-            <a:off x="1524000" y="1122363"/>
-            <a:ext cx="9144000" cy="2387600"/>
+            <a:off x="831850" y="1709738"/>
+            <a:ext cx="10515600" cy="2852737"/>
           </a:xfrm>
         </p:spPr>
         <p:txBody>
           <a:bodyPr anchor="b"/>
           <a:lstStyle>
-            <a:lvl1pPr algn="ctr">
+            <a:lvl1pPr>
               <a:defRPr sz="6000"/>
             </a:lvl1pPr>
           </a:lstStyle>
           <a:p>
             <a:r>
-              <a:rPr lang="en-US"/>
-              <a:t>Click to edit Master title style</a:t>
-            </a:r>
-          </a:p>
-        </p:txBody>
-      </p:sp>
-      <p:sp>
-        <p:nvSpPr>
-          <p:cNvPr id="3" name="Subtitle 2">
-            <a:extLst>
-              <a:ext uri="{FF2B5EF4-FFF2-40B4-BE49-F238E27FC236}">
-                <a16:creationId xmlns:a16="http://schemas.microsoft.com/office/drawing/2014/main" id="{B264F98B-6A87-A35F-DD4B-64A87E29BBE5}"/>
-              </a:ext>
-            </a:extLst>
-          </p:cNvPr>
-          <p:cNvSpPr>
-            <a:spLocks noGrp="1"/>
-          </p:cNvSpPr>
-          <p:nvPr>
-            <p:ph type="subTitle" idx="1"/>
+              <a:rPr lang="cs-CZ"/>
+              <a:t>Kliknutím lze upravit styl.</a:t>
+            </a:r>
+          </a:p>
+        </p:txBody>
+      </p:sp>
+      <p:sp>
+        <p:nvSpPr>
+          <p:cNvPr id="3" name="Zástupný text 2">
+            <a:extLst>
+              <a:ext uri="{FF2B5EF4-FFF2-40B4-BE49-F238E27FC236}">
+                <a16:creationId xmlns:a16="http://schemas.microsoft.com/office/drawing/2014/main" id="{D5F222B4-0697-7241-03DA-0F11F20887CD}"/>
+              </a:ext>
+            </a:extLst>
+          </p:cNvPr>
+          <p:cNvSpPr>
+            <a:spLocks noGrp="1"/>
+          </p:cNvSpPr>
+          <p:nvPr>
+            <p:ph type="body" idx="1"/>
           </p:nvPr>
         </p:nvSpPr>
         <p:spPr>
           <a:xfrm>
-            <a:off x="1524000" y="3602038"/>
-            <a:ext cx="9144000" cy="1655762"/>
+            <a:off x="831850" y="4589463"/>
+            <a:ext cx="10515600" cy="1500187"/>
           </a:xfrm>
         </p:spPr>
         <p:txBody>
           <a:bodyPr/>
           <a:lstStyle>
-            <a:lvl1pPr marL="0" indent="0" algn="ctr">
-              <a:buNone/>
-              <a:defRPr sz="2400"/>
+            <a:lvl1pPr marL="0" indent="0">
+              <a:buNone/>
+              <a:defRPr sz="2400">
+                <a:solidFill>
+                  <a:schemeClr val="tx1">
+                    <a:tint val="82000"/>
+                  </a:schemeClr>
+                </a:solidFill>
+              </a:defRPr>
             </a:lvl1pPr>
-            <a:lvl2pPr marL="457200" indent="0" algn="ctr">
-              <a:buNone/>
-              <a:defRPr sz="2000"/>
+            <a:lvl2pPr marL="457200" indent="0">
+              <a:buNone/>
+              <a:defRPr sz="2000">
+                <a:solidFill>
+                  <a:schemeClr val="tx1">
+                    <a:tint val="82000"/>
+                  </a:schemeClr>
+                </a:solidFill>
+              </a:defRPr>
             </a:lvl2pPr>
-            <a:lvl3pPr marL="914400" indent="0" algn="ctr">
-              <a:buNone/>
-              <a:defRPr sz="1800"/>
+            <a:lvl3pPr marL="914400" indent="0">
+              <a:buNone/>
+              <a:defRPr sz="1800">
+                <a:solidFill>
+                  <a:schemeClr val="tx1">
+                    <a:tint val="82000"/>
+                  </a:schemeClr>
+                </a:solidFill>
+              </a:defRPr>
             </a:lvl3pPr>
-            <a:lvl4pPr marL="1371600" indent="0" algn="ctr">
-              <a:buNone/>
-              <a:defRPr sz="1600"/>
+            <a:lvl4pPr marL="1371600" indent="0">
+              <a:buNone/>
+              <a:defRPr sz="1600">
+                <a:solidFill>
+                  <a:schemeClr val="tx1">
+                    <a:tint val="82000"/>
+                  </a:schemeClr>
+                </a:solidFill>
+              </a:defRPr>
             </a:lvl4pPr>
-            <a:lvl5pPr marL="1828800" indent="0" algn="ctr">
-              <a:buNone/>
-              <a:defRPr sz="1600"/>
+            <a:lvl5pPr marL="1828800" indent="0">
+              <a:buNone/>
+              <a:defRPr sz="1600">
+                <a:solidFill>
+                  <a:schemeClr val="tx1">
+                    <a:tint val="82000"/>
+                  </a:schemeClr>
+                </a:solidFill>
+              </a:defRPr>
             </a:lvl5pPr>
-            <a:lvl6pPr marL="2286000" indent="0" algn="ctr">
-              <a:buNone/>
-              <a:defRPr sz="1600"/>
+            <a:lvl6pPr marL="2286000" indent="0">
+              <a:buNone/>
+              <a:defRPr sz="1600">
+                <a:solidFill>
+                  <a:schemeClr val="tx1">
+                    <a:tint val="82000"/>
+                  </a:schemeClr>
+                </a:solidFill>
+              </a:defRPr>
             </a:lvl6pPr>
-            <a:lvl7pPr marL="2743200" indent="0" algn="ctr">
-              <a:buNone/>
-              <a:defRPr sz="1600"/>
+            <a:lvl7pPr marL="2743200" indent="0">
+              <a:buNone/>
+              <a:defRPr sz="1600">
+                <a:solidFill>
+                  <a:schemeClr val="tx1">
+                    <a:tint val="82000"/>
+                  </a:schemeClr>
+                </a:solidFill>
+              </a:defRPr>
             </a:lvl7pPr>
-            <a:lvl8pPr marL="3200400" indent="0" algn="ctr">
-              <a:buNone/>
-              <a:defRPr sz="1600"/>
+            <a:lvl8pPr marL="3200400" indent="0">
+              <a:buNone/>
+              <a:defRPr sz="1600">
+                <a:solidFill>
+                  <a:schemeClr val="tx1">
+                    <a:tint val="82000"/>
+                  </a:schemeClr>
+                </a:solidFill>
+              </a:defRPr>
             </a:lvl8pPr>
-            <a:lvl9pPr marL="3657600" indent="0" algn="ctr">
-              <a:buNone/>
-              <a:defRPr sz="1600"/>
+            <a:lvl9pPr marL="3657600" indent="0">
+              <a:buNone/>
+              <a:defRPr sz="1600">
+                <a:solidFill>
+                  <a:schemeClr val="tx1">
+                    <a:tint val="82000"/>
+                  </a:schemeClr>
+                </a:solidFill>
+              </a:defRPr>
             </a:lvl9pPr>
           </a:lstStyle>
           <a:p>
-            <a:r>
-              <a:rPr lang="en-US"/>
-              <a:t>Click to edit Master subtitle style</a:t>
-            </a:r>
-          </a:p>
-        </p:txBody>
-      </p:sp>
-      <p:sp>
-        <p:nvSpPr>
-          <p:cNvPr id="4" name="Date Placeholder 3">
-            <a:extLst>
-              <a:ext uri="{FF2B5EF4-FFF2-40B4-BE49-F238E27FC236}">
-                <a16:creationId xmlns:a16="http://schemas.microsoft.com/office/drawing/2014/main" id="{DC7E54C3-F15B-ADCD-36C0-A94E351779F4}"/>
+            <a:pPr lvl="0"/>
+            <a:r>
+              <a:rPr lang="cs-CZ"/>
+              <a:t>Po kliknutí můžete upravovat styly textu v předloze.</a:t>
+            </a:r>
+          </a:p>
+        </p:txBody>
+      </p:sp>
+      <p:sp>
+        <p:nvSpPr>
+          <p:cNvPr id="4" name="Zástupný symbol pro datum 3">
+            <a:extLst>
+              <a:ext uri="{FF2B5EF4-FFF2-40B4-BE49-F238E27FC236}">
+                <a16:creationId xmlns:a16="http://schemas.microsoft.com/office/drawing/2014/main" id="{70E1AC02-BE0E-FAB4-1203-391050226388}"/>
               </a:ext>
             </a:extLst>
           </p:cNvPr>
@@ -1337,20 +1133,20 @@
           <a:bodyPr/>
           <a:lstStyle/>
           <a:p>
-            <a:fld id="{0018DC77-AFD7-447A-A41B-36AE4CC7F50D}" type="datetimeFigureOut">
-              <a:rPr lang="en-US" smtClean="0"/>
-              <a:t>2/8/2025</a:t>
+            <a:fld id="{6DB30A3A-EBE1-42FC-9BF1-79FFB867F05B}" type="datetimeFigureOut">
+              <a:rPr lang="cs-CZ" smtClean="0"/>
+              <a:t>04.01.2026</a:t>
             </a:fld>
-            <a:endParaRPr lang="en-US"/>
-          </a:p>
-        </p:txBody>
-      </p:sp>
-      <p:sp>
-        <p:nvSpPr>
-          <p:cNvPr id="5" name="Footer Placeholder 4">
-            <a:extLst>
-              <a:ext uri="{FF2B5EF4-FFF2-40B4-BE49-F238E27FC236}">
-                <a16:creationId xmlns:a16="http://schemas.microsoft.com/office/drawing/2014/main" id="{9E795EA5-9AE8-0DA2-0F76-9F4DB0E8A9BB}"/>
+            <a:endParaRPr lang="cs-CZ"/>
+          </a:p>
+        </p:txBody>
+      </p:sp>
+      <p:sp>
+        <p:nvSpPr>
+          <p:cNvPr id="5" name="Zástupný symbol pro zápatí 4">
+            <a:extLst>
+              <a:ext uri="{FF2B5EF4-FFF2-40B4-BE49-F238E27FC236}">
+                <a16:creationId xmlns:a16="http://schemas.microsoft.com/office/drawing/2014/main" id="{C0C40BF3-C350-2D4B-B388-A45B9154A615}"/>
               </a:ext>
             </a:extLst>
           </p:cNvPr>
@@ -1366,16 +1162,16 @@
           <a:bodyPr/>
           <a:lstStyle/>
           <a:p>
-            <a:endParaRPr lang="en-US"/>
-          </a:p>
-        </p:txBody>
-      </p:sp>
-      <p:sp>
-        <p:nvSpPr>
-          <p:cNvPr id="6" name="Slide Number Placeholder 5">
-            <a:extLst>
-              <a:ext uri="{FF2B5EF4-FFF2-40B4-BE49-F238E27FC236}">
-                <a16:creationId xmlns:a16="http://schemas.microsoft.com/office/drawing/2014/main" id="{867A9C2C-C9B8-6194-353B-F40BFC0833B4}"/>
+            <a:endParaRPr lang="cs-CZ"/>
+          </a:p>
+        </p:txBody>
+      </p:sp>
+      <p:sp>
+        <p:nvSpPr>
+          <p:cNvPr id="6" name="Zástupný symbol pro číslo snímku 5">
+            <a:extLst>
+              <a:ext uri="{FF2B5EF4-FFF2-40B4-BE49-F238E27FC236}">
+                <a16:creationId xmlns:a16="http://schemas.microsoft.com/office/drawing/2014/main" id="{3038AE01-AE57-949D-25FA-2EC379A85012}"/>
               </a:ext>
             </a:extLst>
           </p:cNvPr>
@@ -1391,18 +1187,18 @@
           <a:bodyPr/>
           <a:lstStyle/>
           <a:p>
-            <a:fld id="{6B2E6DA3-2A58-4FDF-9A98-658FEFDD9C33}" type="slidenum">
-              <a:rPr lang="en-US" smtClean="0"/>
+            <a:fld id="{32129535-2FF0-4674-BDE8-A1FD8B542E18}" type="slidenum">
+              <a:rPr lang="cs-CZ" smtClean="0"/>
               <a:t>‹#›</a:t>
             </a:fld>
-            <a:endParaRPr lang="en-US"/>
+            <a:endParaRPr lang="cs-CZ"/>
           </a:p>
         </p:txBody>
       </p:sp>
     </p:spTree>
     <p:extLst>
       <p:ext uri="{BB962C8B-B14F-4D97-AF65-F5344CB8AC3E}">
-        <p14:creationId xmlns:p14="http://schemas.microsoft.com/office/powerpoint/2010/main" val="2729335492"/>
+        <p14:creationId xmlns:p14="http://schemas.microsoft.com/office/powerpoint/2010/main" val="1568230616"/>
       </p:ext>
     </p:extLst>
   </p:cSld>
@@ -1413,8 +1209,8 @@
 </file>
 
 <file path=ppt/slideLayouts/slideLayout4.xml><?xml version="1.0" encoding="utf-8"?>
-<p:sldLayout xmlns:a="http://schemas.openxmlformats.org/drawingml/2006/main" xmlns:r="http://schemas.openxmlformats.org/officeDocument/2006/relationships" xmlns:p="http://schemas.openxmlformats.org/presentationml/2006/main" type="titleOnly" preserve="1">
-  <p:cSld name="Title Only">
+<p:sldLayout xmlns:a="http://schemas.openxmlformats.org/drawingml/2006/main" xmlns:r="http://schemas.openxmlformats.org/officeDocument/2006/relationships" xmlns:p="http://schemas.openxmlformats.org/presentationml/2006/main" type="twoObj" preserve="1">
+  <p:cSld name="Dva obsahy">
     <p:spTree>
       <p:nvGrpSpPr>
         <p:cNvPr id="1" name=""/>
@@ -1431,10 +1227,10 @@
       </p:grpSpPr>
       <p:sp>
         <p:nvSpPr>
-          <p:cNvPr id="2" name="Title 1">
-            <a:extLst>
-              <a:ext uri="{FF2B5EF4-FFF2-40B4-BE49-F238E27FC236}">
-                <a16:creationId xmlns:a16="http://schemas.microsoft.com/office/drawing/2014/main" id="{13413E2C-238F-53FF-3A71-C8254F5B8DCF}"/>
+          <p:cNvPr id="2" name="Nadpis 1">
+            <a:extLst>
+              <a:ext uri="{FF2B5EF4-FFF2-40B4-BE49-F238E27FC236}">
+                <a16:creationId xmlns:a16="http://schemas.microsoft.com/office/drawing/2014/main" id="{6F4C3792-8CA7-722A-EB95-F699F40D4CC8}"/>
               </a:ext>
             </a:extLst>
           </p:cNvPr>
@@ -1451,18 +1247,142 @@
           <a:lstStyle/>
           <a:p>
             <a:r>
-              <a:rPr lang="en-US"/>
-              <a:t>Click to edit Master title style</a:t>
-            </a:r>
-          </a:p>
-        </p:txBody>
-      </p:sp>
-      <p:sp>
-        <p:nvSpPr>
-          <p:cNvPr id="3" name="Date Placeholder 2">
-            <a:extLst>
-              <a:ext uri="{FF2B5EF4-FFF2-40B4-BE49-F238E27FC236}">
-                <a16:creationId xmlns:a16="http://schemas.microsoft.com/office/drawing/2014/main" id="{24DD7539-6BEA-9DA8-C905-32FE4857DAEE}"/>
+              <a:rPr lang="cs-CZ"/>
+              <a:t>Kliknutím lze upravit styl.</a:t>
+            </a:r>
+          </a:p>
+        </p:txBody>
+      </p:sp>
+      <p:sp>
+        <p:nvSpPr>
+          <p:cNvPr id="3" name="Zástupný obsah 2">
+            <a:extLst>
+              <a:ext uri="{FF2B5EF4-FFF2-40B4-BE49-F238E27FC236}">
+                <a16:creationId xmlns:a16="http://schemas.microsoft.com/office/drawing/2014/main" id="{52192E2F-24BD-37E6-C04F-60C690F4AEE0}"/>
+              </a:ext>
+            </a:extLst>
+          </p:cNvPr>
+          <p:cNvSpPr>
+            <a:spLocks noGrp="1"/>
+          </p:cNvSpPr>
+          <p:nvPr>
+            <p:ph sz="half" idx="1"/>
+          </p:nvPr>
+        </p:nvSpPr>
+        <p:spPr>
+          <a:xfrm>
+            <a:off x="838200" y="1825625"/>
+            <a:ext cx="5181600" cy="4351338"/>
+          </a:xfrm>
+        </p:spPr>
+        <p:txBody>
+          <a:bodyPr/>
+          <a:lstStyle/>
+          <a:p>
+            <a:pPr lvl="0"/>
+            <a:r>
+              <a:rPr lang="cs-CZ"/>
+              <a:t>Po kliknutí můžete upravovat styly textu v předloze.</a:t>
+            </a:r>
+          </a:p>
+          <a:p>
+            <a:pPr lvl="1"/>
+            <a:r>
+              <a:rPr lang="cs-CZ"/>
+              <a:t>Druhá úroveň</a:t>
+            </a:r>
+          </a:p>
+          <a:p>
+            <a:pPr lvl="2"/>
+            <a:r>
+              <a:rPr lang="cs-CZ"/>
+              <a:t>Třetí úroveň</a:t>
+            </a:r>
+          </a:p>
+          <a:p>
+            <a:pPr lvl="3"/>
+            <a:r>
+              <a:rPr lang="cs-CZ"/>
+              <a:t>Čtvrtá úroveň</a:t>
+            </a:r>
+          </a:p>
+          <a:p>
+            <a:pPr lvl="4"/>
+            <a:r>
+              <a:rPr lang="cs-CZ"/>
+              <a:t>Pátá úroveň</a:t>
+            </a:r>
+          </a:p>
+        </p:txBody>
+      </p:sp>
+      <p:sp>
+        <p:nvSpPr>
+          <p:cNvPr id="4" name="Zástupný obsah 3">
+            <a:extLst>
+              <a:ext uri="{FF2B5EF4-FFF2-40B4-BE49-F238E27FC236}">
+                <a16:creationId xmlns:a16="http://schemas.microsoft.com/office/drawing/2014/main" id="{2F3AA63B-9D0F-B105-9254-E09E664464EF}"/>
+              </a:ext>
+            </a:extLst>
+          </p:cNvPr>
+          <p:cNvSpPr>
+            <a:spLocks noGrp="1"/>
+          </p:cNvSpPr>
+          <p:nvPr>
+            <p:ph sz="half" idx="2"/>
+          </p:nvPr>
+        </p:nvSpPr>
+        <p:spPr>
+          <a:xfrm>
+            <a:off x="6172200" y="1825625"/>
+            <a:ext cx="5181600" cy="4351338"/>
+          </a:xfrm>
+        </p:spPr>
+        <p:txBody>
+          <a:bodyPr/>
+          <a:lstStyle/>
+          <a:p>
+            <a:pPr lvl="0"/>
+            <a:r>
+              <a:rPr lang="cs-CZ"/>
+              <a:t>Po kliknutí můžete upravovat styly textu v předloze.</a:t>
+            </a:r>
+          </a:p>
+          <a:p>
+            <a:pPr lvl="1"/>
+            <a:r>
+              <a:rPr lang="cs-CZ"/>
+              <a:t>Druhá úroveň</a:t>
+            </a:r>
+          </a:p>
+          <a:p>
+            <a:pPr lvl="2"/>
+            <a:r>
+              <a:rPr lang="cs-CZ"/>
+              <a:t>Třetí úroveň</a:t>
+            </a:r>
+          </a:p>
+          <a:p>
+            <a:pPr lvl="3"/>
+            <a:r>
+              <a:rPr lang="cs-CZ"/>
+              <a:t>Čtvrtá úroveň</a:t>
+            </a:r>
+          </a:p>
+          <a:p>
+            <a:pPr lvl="4"/>
+            <a:r>
+              <a:rPr lang="cs-CZ"/>
+              <a:t>Pátá úroveň</a:t>
+            </a:r>
+          </a:p>
+        </p:txBody>
+      </p:sp>
+      <p:sp>
+        <p:nvSpPr>
+          <p:cNvPr id="5" name="Zástupný symbol pro datum 4">
+            <a:extLst>
+              <a:ext uri="{FF2B5EF4-FFF2-40B4-BE49-F238E27FC236}">
+                <a16:creationId xmlns:a16="http://schemas.microsoft.com/office/drawing/2014/main" id="{B3A0BE9E-1382-1FD0-B0FE-36C65E5BA42E}"/>
               </a:ext>
             </a:extLst>
           </p:cNvPr>
@@ -1478,20 +1398,20 @@
           <a:bodyPr/>
           <a:lstStyle/>
           <a:p>
-            <a:fld id="{0018DC77-AFD7-447A-A41B-36AE4CC7F50D}" type="datetimeFigureOut">
-              <a:rPr lang="en-US" smtClean="0"/>
-              <a:t>2/8/2025</a:t>
+            <a:fld id="{6DB30A3A-EBE1-42FC-9BF1-79FFB867F05B}" type="datetimeFigureOut">
+              <a:rPr lang="cs-CZ" smtClean="0"/>
+              <a:t>04.01.2026</a:t>
             </a:fld>
-            <a:endParaRPr lang="en-US"/>
-          </a:p>
-        </p:txBody>
-      </p:sp>
-      <p:sp>
-        <p:nvSpPr>
-          <p:cNvPr id="4" name="Footer Placeholder 3">
-            <a:extLst>
-              <a:ext uri="{FF2B5EF4-FFF2-40B4-BE49-F238E27FC236}">
-                <a16:creationId xmlns:a16="http://schemas.microsoft.com/office/drawing/2014/main" id="{7748FC9D-3F28-EC79-9307-523DEA96888C}"/>
+            <a:endParaRPr lang="cs-CZ"/>
+          </a:p>
+        </p:txBody>
+      </p:sp>
+      <p:sp>
+        <p:nvSpPr>
+          <p:cNvPr id="6" name="Zástupný symbol pro zápatí 5">
+            <a:extLst>
+              <a:ext uri="{FF2B5EF4-FFF2-40B4-BE49-F238E27FC236}">
+                <a16:creationId xmlns:a16="http://schemas.microsoft.com/office/drawing/2014/main" id="{C223E279-FEB1-3544-29F0-0B841C9DE953}"/>
               </a:ext>
             </a:extLst>
           </p:cNvPr>
@@ -1507,16 +1427,16 @@
           <a:bodyPr/>
           <a:lstStyle/>
           <a:p>
-            <a:endParaRPr lang="en-US"/>
-          </a:p>
-        </p:txBody>
-      </p:sp>
-      <p:sp>
-        <p:nvSpPr>
-          <p:cNvPr id="5" name="Slide Number Placeholder 4">
-            <a:extLst>
-              <a:ext uri="{FF2B5EF4-FFF2-40B4-BE49-F238E27FC236}">
-                <a16:creationId xmlns:a16="http://schemas.microsoft.com/office/drawing/2014/main" id="{B72F9A4F-9CDD-5DF4-63A3-78F4C7F36B4B}"/>
+            <a:endParaRPr lang="cs-CZ"/>
+          </a:p>
+        </p:txBody>
+      </p:sp>
+      <p:sp>
+        <p:nvSpPr>
+          <p:cNvPr id="7" name="Zástupný symbol pro číslo snímku 6">
+            <a:extLst>
+              <a:ext uri="{FF2B5EF4-FFF2-40B4-BE49-F238E27FC236}">
+                <a16:creationId xmlns:a16="http://schemas.microsoft.com/office/drawing/2014/main" id="{E719E60A-DE56-41D5-2DAC-76DE133CEAB0}"/>
               </a:ext>
             </a:extLst>
           </p:cNvPr>
@@ -1532,18 +1452,18 @@
           <a:bodyPr/>
           <a:lstStyle/>
           <a:p>
-            <a:fld id="{6B2E6DA3-2A58-4FDF-9A98-658FEFDD9C33}" type="slidenum">
-              <a:rPr lang="en-US" smtClean="0"/>
+            <a:fld id="{32129535-2FF0-4674-BDE8-A1FD8B542E18}" type="slidenum">
+              <a:rPr lang="cs-CZ" smtClean="0"/>
               <a:t>‹#›</a:t>
             </a:fld>
-            <a:endParaRPr lang="en-US"/>
+            <a:endParaRPr lang="cs-CZ"/>
           </a:p>
         </p:txBody>
       </p:sp>
     </p:spTree>
     <p:extLst>
       <p:ext uri="{BB962C8B-B14F-4D97-AF65-F5344CB8AC3E}">
-        <p14:creationId xmlns:p14="http://schemas.microsoft.com/office/powerpoint/2010/main" val="1342522207"/>
+        <p14:creationId xmlns:p14="http://schemas.microsoft.com/office/powerpoint/2010/main" val="4129349872"/>
       </p:ext>
     </p:extLst>
   </p:cSld>
@@ -1554,8 +1474,8 @@
 </file>
 
 <file path=ppt/slideLayouts/slideLayout5.xml><?xml version="1.0" encoding="utf-8"?>
-<p:sldLayout xmlns:a="http://schemas.openxmlformats.org/drawingml/2006/main" xmlns:r="http://schemas.openxmlformats.org/officeDocument/2006/relationships" xmlns:p="http://schemas.openxmlformats.org/presentationml/2006/main" type="obj" preserve="1">
-  <p:cSld name="Title and Content">
+<p:sldLayout xmlns:a="http://schemas.openxmlformats.org/drawingml/2006/main" xmlns:r="http://schemas.openxmlformats.org/officeDocument/2006/relationships" xmlns:p="http://schemas.openxmlformats.org/presentationml/2006/main" type="twoTxTwoObj" preserve="1">
+  <p:cSld name="Porovnání">
     <p:spTree>
       <p:nvGrpSpPr>
         <p:cNvPr id="1" name=""/>
@@ -1572,10 +1492,10 @@
       </p:grpSpPr>
       <p:sp>
         <p:nvSpPr>
-          <p:cNvPr id="2" name="Title 1">
-            <a:extLst>
-              <a:ext uri="{FF2B5EF4-FFF2-40B4-BE49-F238E27FC236}">
-                <a16:creationId xmlns:a16="http://schemas.microsoft.com/office/drawing/2014/main" id="{997DDAA8-8E2D-5971-FCC6-F47AD1415C3C}"/>
+          <p:cNvPr id="2" name="Nadpis 1">
+            <a:extLst>
+              <a:ext uri="{FF2B5EF4-FFF2-40B4-BE49-F238E27FC236}">
+                <a16:creationId xmlns:a16="http://schemas.microsoft.com/office/drawing/2014/main" id="{A9BC125D-7693-CB26-C8DD-CEE2BA0C1668}"/>
               </a:ext>
             </a:extLst>
           </p:cNvPr>
@@ -1586,81 +1506,295 @@
             <p:ph type="title"/>
           </p:nvPr>
         </p:nvSpPr>
-        <p:spPr/>
-        <p:txBody>
-          <a:bodyPr/>
-          <a:lstStyle/>
-          <a:p>
-            <a:r>
-              <a:rPr lang="en-US"/>
-              <a:t>Click to edit Master title style</a:t>
-            </a:r>
-          </a:p>
-        </p:txBody>
-      </p:sp>
-      <p:sp>
-        <p:nvSpPr>
-          <p:cNvPr id="3" name="Content Placeholder 2">
-            <a:extLst>
-              <a:ext uri="{FF2B5EF4-FFF2-40B4-BE49-F238E27FC236}">
-                <a16:creationId xmlns:a16="http://schemas.microsoft.com/office/drawing/2014/main" id="{BC08E2FE-6E2D-E0CE-ED4F-FEB6FC524DF1}"/>
-              </a:ext>
-            </a:extLst>
-          </p:cNvPr>
-          <p:cNvSpPr>
-            <a:spLocks noGrp="1"/>
-          </p:cNvSpPr>
-          <p:nvPr>
-            <p:ph idx="1"/>
-          </p:nvPr>
-        </p:nvSpPr>
-        <p:spPr/>
-        <p:txBody>
-          <a:bodyPr/>
-          <a:lstStyle/>
+        <p:spPr>
+          <a:xfrm>
+            <a:off x="839788" y="365125"/>
+            <a:ext cx="10515600" cy="1325563"/>
+          </a:xfrm>
+        </p:spPr>
+        <p:txBody>
+          <a:bodyPr/>
+          <a:lstStyle/>
+          <a:p>
+            <a:r>
+              <a:rPr lang="cs-CZ"/>
+              <a:t>Kliknutím lze upravit styl.</a:t>
+            </a:r>
+          </a:p>
+        </p:txBody>
+      </p:sp>
+      <p:sp>
+        <p:nvSpPr>
+          <p:cNvPr id="3" name="Zástupný text 2">
+            <a:extLst>
+              <a:ext uri="{FF2B5EF4-FFF2-40B4-BE49-F238E27FC236}">
+                <a16:creationId xmlns:a16="http://schemas.microsoft.com/office/drawing/2014/main" id="{D731AADE-C9CB-E62E-BC38-BF4BD01EE64B}"/>
+              </a:ext>
+            </a:extLst>
+          </p:cNvPr>
+          <p:cNvSpPr>
+            <a:spLocks noGrp="1"/>
+          </p:cNvSpPr>
+          <p:nvPr>
+            <p:ph type="body" idx="1"/>
+          </p:nvPr>
+        </p:nvSpPr>
+        <p:spPr>
+          <a:xfrm>
+            <a:off x="839788" y="1681163"/>
+            <a:ext cx="5157787" cy="823912"/>
+          </a:xfrm>
+        </p:spPr>
+        <p:txBody>
+          <a:bodyPr anchor="b"/>
+          <a:lstStyle>
+            <a:lvl1pPr marL="0" indent="0">
+              <a:buNone/>
+              <a:defRPr sz="2400" b="1"/>
+            </a:lvl1pPr>
+            <a:lvl2pPr marL="457200" indent="0">
+              <a:buNone/>
+              <a:defRPr sz="2000" b="1"/>
+            </a:lvl2pPr>
+            <a:lvl3pPr marL="914400" indent="0">
+              <a:buNone/>
+              <a:defRPr sz="1800" b="1"/>
+            </a:lvl3pPr>
+            <a:lvl4pPr marL="1371600" indent="0">
+              <a:buNone/>
+              <a:defRPr sz="1600" b="1"/>
+            </a:lvl4pPr>
+            <a:lvl5pPr marL="1828800" indent="0">
+              <a:buNone/>
+              <a:defRPr sz="1600" b="1"/>
+            </a:lvl5pPr>
+            <a:lvl6pPr marL="2286000" indent="0">
+              <a:buNone/>
+              <a:defRPr sz="1600" b="1"/>
+            </a:lvl6pPr>
+            <a:lvl7pPr marL="2743200" indent="0">
+              <a:buNone/>
+              <a:defRPr sz="1600" b="1"/>
+            </a:lvl7pPr>
+            <a:lvl8pPr marL="3200400" indent="0">
+              <a:buNone/>
+              <a:defRPr sz="1600" b="1"/>
+            </a:lvl8pPr>
+            <a:lvl9pPr marL="3657600" indent="0">
+              <a:buNone/>
+              <a:defRPr sz="1600" b="1"/>
+            </a:lvl9pPr>
+          </a:lstStyle>
           <a:p>
             <a:pPr lvl="0"/>
             <a:r>
-              <a:rPr lang="en-US"/>
-              <a:t>Click to edit Master text styles</a:t>
+              <a:rPr lang="cs-CZ"/>
+              <a:t>Po kliknutí můžete upravovat styly textu v předloze.</a:t>
+            </a:r>
+          </a:p>
+        </p:txBody>
+      </p:sp>
+      <p:sp>
+        <p:nvSpPr>
+          <p:cNvPr id="4" name="Zástupný obsah 3">
+            <a:extLst>
+              <a:ext uri="{FF2B5EF4-FFF2-40B4-BE49-F238E27FC236}">
+                <a16:creationId xmlns:a16="http://schemas.microsoft.com/office/drawing/2014/main" id="{26C8439E-F0BF-E431-ECDF-B748F28F85A7}"/>
+              </a:ext>
+            </a:extLst>
+          </p:cNvPr>
+          <p:cNvSpPr>
+            <a:spLocks noGrp="1"/>
+          </p:cNvSpPr>
+          <p:nvPr>
+            <p:ph sz="half" idx="2"/>
+          </p:nvPr>
+        </p:nvSpPr>
+        <p:spPr>
+          <a:xfrm>
+            <a:off x="839788" y="2505075"/>
+            <a:ext cx="5157787" cy="3684588"/>
+          </a:xfrm>
+        </p:spPr>
+        <p:txBody>
+          <a:bodyPr/>
+          <a:lstStyle/>
+          <a:p>
+            <a:pPr lvl="0"/>
+            <a:r>
+              <a:rPr lang="cs-CZ"/>
+              <a:t>Po kliknutí můžete upravovat styly textu v předloze.</a:t>
             </a:r>
           </a:p>
           <a:p>
             <a:pPr lvl="1"/>
             <a:r>
-              <a:rPr lang="en-US"/>
-              <a:t>Second level</a:t>
+              <a:rPr lang="cs-CZ"/>
+              <a:t>Druhá úroveň</a:t>
             </a:r>
           </a:p>
           <a:p>
             <a:pPr lvl="2"/>
             <a:r>
-              <a:rPr lang="en-US"/>
-              <a:t>Third level</a:t>
+              <a:rPr lang="cs-CZ"/>
+              <a:t>Třetí úroveň</a:t>
             </a:r>
           </a:p>
           <a:p>
             <a:pPr lvl="3"/>
             <a:r>
-              <a:rPr lang="en-US"/>
-              <a:t>Fourth level</a:t>
+              <a:rPr lang="cs-CZ"/>
+              <a:t>Čtvrtá úroveň</a:t>
             </a:r>
           </a:p>
           <a:p>
             <a:pPr lvl="4"/>
             <a:r>
-              <a:rPr lang="en-US"/>
-              <a:t>Fifth level</a:t>
-            </a:r>
-          </a:p>
-        </p:txBody>
-      </p:sp>
-      <p:sp>
-        <p:nvSpPr>
-          <p:cNvPr id="4" name="Date Placeholder 3">
-            <a:extLst>
-              <a:ext uri="{FF2B5EF4-FFF2-40B4-BE49-F238E27FC236}">
-                <a16:creationId xmlns:a16="http://schemas.microsoft.com/office/drawing/2014/main" id="{F5470946-B2B7-1365-D8DC-0890D322A0C1}"/>
+              <a:rPr lang="cs-CZ"/>
+              <a:t>Pátá úroveň</a:t>
+            </a:r>
+          </a:p>
+        </p:txBody>
+      </p:sp>
+      <p:sp>
+        <p:nvSpPr>
+          <p:cNvPr id="5" name="Zástupný text 4">
+            <a:extLst>
+              <a:ext uri="{FF2B5EF4-FFF2-40B4-BE49-F238E27FC236}">
+                <a16:creationId xmlns:a16="http://schemas.microsoft.com/office/drawing/2014/main" id="{009ECC36-91DE-BFCA-C263-5B9AA40B00B0}"/>
+              </a:ext>
+            </a:extLst>
+          </p:cNvPr>
+          <p:cNvSpPr>
+            <a:spLocks noGrp="1"/>
+          </p:cNvSpPr>
+          <p:nvPr>
+            <p:ph type="body" sz="quarter" idx="3"/>
+          </p:nvPr>
+        </p:nvSpPr>
+        <p:spPr>
+          <a:xfrm>
+            <a:off x="6172200" y="1681163"/>
+            <a:ext cx="5183188" cy="823912"/>
+          </a:xfrm>
+        </p:spPr>
+        <p:txBody>
+          <a:bodyPr anchor="b"/>
+          <a:lstStyle>
+            <a:lvl1pPr marL="0" indent="0">
+              <a:buNone/>
+              <a:defRPr sz="2400" b="1"/>
+            </a:lvl1pPr>
+            <a:lvl2pPr marL="457200" indent="0">
+              <a:buNone/>
+              <a:defRPr sz="2000" b="1"/>
+            </a:lvl2pPr>
+            <a:lvl3pPr marL="914400" indent="0">
+              <a:buNone/>
+              <a:defRPr sz="1800" b="1"/>
+            </a:lvl3pPr>
+            <a:lvl4pPr marL="1371600" indent="0">
+              <a:buNone/>
+              <a:defRPr sz="1600" b="1"/>
+            </a:lvl4pPr>
+            <a:lvl5pPr marL="1828800" indent="0">
+              <a:buNone/>
+              <a:defRPr sz="1600" b="1"/>
+            </a:lvl5pPr>
+            <a:lvl6pPr marL="2286000" indent="0">
+              <a:buNone/>
+              <a:defRPr sz="1600" b="1"/>
+            </a:lvl6pPr>
+            <a:lvl7pPr marL="2743200" indent="0">
+              <a:buNone/>
+              <a:defRPr sz="1600" b="1"/>
+            </a:lvl7pPr>
+            <a:lvl8pPr marL="3200400" indent="0">
+              <a:buNone/>
+              <a:defRPr sz="1600" b="1"/>
+            </a:lvl8pPr>
+            <a:lvl9pPr marL="3657600" indent="0">
+              <a:buNone/>
+              <a:defRPr sz="1600" b="1"/>
+            </a:lvl9pPr>
+          </a:lstStyle>
+          <a:p>
+            <a:pPr lvl="0"/>
+            <a:r>
+              <a:rPr lang="cs-CZ"/>
+              <a:t>Po kliknutí můžete upravovat styly textu v předloze.</a:t>
+            </a:r>
+          </a:p>
+        </p:txBody>
+      </p:sp>
+      <p:sp>
+        <p:nvSpPr>
+          <p:cNvPr id="6" name="Zástupný obsah 5">
+            <a:extLst>
+              <a:ext uri="{FF2B5EF4-FFF2-40B4-BE49-F238E27FC236}">
+                <a16:creationId xmlns:a16="http://schemas.microsoft.com/office/drawing/2014/main" id="{46160B5F-0BE7-84A6-6005-D1B046776434}"/>
+              </a:ext>
+            </a:extLst>
+          </p:cNvPr>
+          <p:cNvSpPr>
+            <a:spLocks noGrp="1"/>
+          </p:cNvSpPr>
+          <p:nvPr>
+            <p:ph sz="quarter" idx="4"/>
+          </p:nvPr>
+        </p:nvSpPr>
+        <p:spPr>
+          <a:xfrm>
+            <a:off x="6172200" y="2505075"/>
+            <a:ext cx="5183188" cy="3684588"/>
+          </a:xfrm>
+        </p:spPr>
+        <p:txBody>
+          <a:bodyPr/>
+          <a:lstStyle/>
+          <a:p>
+            <a:pPr lvl="0"/>
+            <a:r>
+              <a:rPr lang="cs-CZ"/>
+              <a:t>Po kliknutí můžete upravovat styly textu v předloze.</a:t>
+            </a:r>
+          </a:p>
+          <a:p>
+            <a:pPr lvl="1"/>
+            <a:r>
+              <a:rPr lang="cs-CZ"/>
+              <a:t>Druhá úroveň</a:t>
+            </a:r>
+          </a:p>
+          <a:p>
+            <a:pPr lvl="2"/>
+            <a:r>
+              <a:rPr lang="cs-CZ"/>
+              <a:t>Třetí úroveň</a:t>
+            </a:r>
+          </a:p>
+          <a:p>
+            <a:pPr lvl="3"/>
+            <a:r>
+              <a:rPr lang="cs-CZ"/>
+              <a:t>Čtvrtá úroveň</a:t>
+            </a:r>
+          </a:p>
+          <a:p>
+            <a:pPr lvl="4"/>
+            <a:r>
+              <a:rPr lang="cs-CZ"/>
+              <a:t>Pátá úroveň</a:t>
+            </a:r>
+          </a:p>
+        </p:txBody>
+      </p:sp>
+      <p:sp>
+        <p:nvSpPr>
+          <p:cNvPr id="7" name="Zástupný symbol pro datum 6">
+            <a:extLst>
+              <a:ext uri="{FF2B5EF4-FFF2-40B4-BE49-F238E27FC236}">
+                <a16:creationId xmlns:a16="http://schemas.microsoft.com/office/drawing/2014/main" id="{E725F8CC-A982-CBA0-04D5-3FAC809F429B}"/>
               </a:ext>
             </a:extLst>
           </p:cNvPr>
@@ -1676,20 +1810,20 @@
           <a:bodyPr/>
           <a:lstStyle/>
           <a:p>
-            <a:fld id="{0018DC77-AFD7-447A-A41B-36AE4CC7F50D}" type="datetimeFigureOut">
-              <a:rPr lang="en-US" smtClean="0"/>
-              <a:t>2/8/2025</a:t>
+            <a:fld id="{6DB30A3A-EBE1-42FC-9BF1-79FFB867F05B}" type="datetimeFigureOut">
+              <a:rPr lang="cs-CZ" smtClean="0"/>
+              <a:t>04.01.2026</a:t>
             </a:fld>
-            <a:endParaRPr lang="en-US"/>
-          </a:p>
-        </p:txBody>
-      </p:sp>
-      <p:sp>
-        <p:nvSpPr>
-          <p:cNvPr id="5" name="Footer Placeholder 4">
-            <a:extLst>
-              <a:ext uri="{FF2B5EF4-FFF2-40B4-BE49-F238E27FC236}">
-                <a16:creationId xmlns:a16="http://schemas.microsoft.com/office/drawing/2014/main" id="{A1369D67-AA99-610F-1E81-25EE3E9975B4}"/>
+            <a:endParaRPr lang="cs-CZ"/>
+          </a:p>
+        </p:txBody>
+      </p:sp>
+      <p:sp>
+        <p:nvSpPr>
+          <p:cNvPr id="8" name="Zástupný symbol pro zápatí 7">
+            <a:extLst>
+              <a:ext uri="{FF2B5EF4-FFF2-40B4-BE49-F238E27FC236}">
+                <a16:creationId xmlns:a16="http://schemas.microsoft.com/office/drawing/2014/main" id="{3F50CF90-1DF1-9F6A-CDDE-D388D4ABE684}"/>
               </a:ext>
             </a:extLst>
           </p:cNvPr>
@@ -1705,16 +1839,16 @@
           <a:bodyPr/>
           <a:lstStyle/>
           <a:p>
-            <a:endParaRPr lang="en-US"/>
-          </a:p>
-        </p:txBody>
-      </p:sp>
-      <p:sp>
-        <p:nvSpPr>
-          <p:cNvPr id="6" name="Slide Number Placeholder 5">
-            <a:extLst>
-              <a:ext uri="{FF2B5EF4-FFF2-40B4-BE49-F238E27FC236}">
-                <a16:creationId xmlns:a16="http://schemas.microsoft.com/office/drawing/2014/main" id="{FFC7074B-C79A-61DF-84D4-0472171BF530}"/>
+            <a:endParaRPr lang="cs-CZ"/>
+          </a:p>
+        </p:txBody>
+      </p:sp>
+      <p:sp>
+        <p:nvSpPr>
+          <p:cNvPr id="9" name="Zástupný symbol pro číslo snímku 8">
+            <a:extLst>
+              <a:ext uri="{FF2B5EF4-FFF2-40B4-BE49-F238E27FC236}">
+                <a16:creationId xmlns:a16="http://schemas.microsoft.com/office/drawing/2014/main" id="{295CEEEC-E69C-BD89-59F8-6F8AF64AE81C}"/>
               </a:ext>
             </a:extLst>
           </p:cNvPr>
@@ -1730,18 +1864,18 @@
           <a:bodyPr/>
           <a:lstStyle/>
           <a:p>
-            <a:fld id="{6B2E6DA3-2A58-4FDF-9A98-658FEFDD9C33}" type="slidenum">
-              <a:rPr lang="en-US" smtClean="0"/>
+            <a:fld id="{32129535-2FF0-4674-BDE8-A1FD8B542E18}" type="slidenum">
+              <a:rPr lang="cs-CZ" smtClean="0"/>
               <a:t>‹#›</a:t>
             </a:fld>
-            <a:endParaRPr lang="en-US"/>
+            <a:endParaRPr lang="cs-CZ"/>
           </a:p>
         </p:txBody>
       </p:sp>
     </p:spTree>
     <p:extLst>
       <p:ext uri="{BB962C8B-B14F-4D97-AF65-F5344CB8AC3E}">
-        <p14:creationId xmlns:p14="http://schemas.microsoft.com/office/powerpoint/2010/main" val="192620313"/>
+        <p14:creationId xmlns:p14="http://schemas.microsoft.com/office/powerpoint/2010/main" val="210027862"/>
       </p:ext>
     </p:extLst>
   </p:cSld>
@@ -1752,8 +1886,8 @@
 </file>
 
 <file path=ppt/slideLayouts/slideLayout6.xml><?xml version="1.0" encoding="utf-8"?>
-<p:sldLayout xmlns:a="http://schemas.openxmlformats.org/drawingml/2006/main" xmlns:r="http://schemas.openxmlformats.org/officeDocument/2006/relationships" xmlns:p="http://schemas.openxmlformats.org/presentationml/2006/main" type="objTx" preserve="1">
-  <p:cSld name="Content with Caption">
+<p:sldLayout xmlns:a="http://schemas.openxmlformats.org/drawingml/2006/main" xmlns:r="http://schemas.openxmlformats.org/officeDocument/2006/relationships" xmlns:p="http://schemas.openxmlformats.org/presentationml/2006/main" type="titleOnly" preserve="1">
+  <p:cSld name="Jenom nadpis">
     <p:spTree>
       <p:nvGrpSpPr>
         <p:cNvPr id="1" name=""/>
@@ -1770,10 +1904,264 @@
       </p:grpSpPr>
       <p:sp>
         <p:nvSpPr>
-          <p:cNvPr id="2" name="Title 1">
-            <a:extLst>
-              <a:ext uri="{FF2B5EF4-FFF2-40B4-BE49-F238E27FC236}">
-                <a16:creationId xmlns:a16="http://schemas.microsoft.com/office/drawing/2014/main" id="{D98BBE9B-029D-041B-F348-5ECD1A331ACC}"/>
+          <p:cNvPr id="2" name="Nadpis 1">
+            <a:extLst>
+              <a:ext uri="{FF2B5EF4-FFF2-40B4-BE49-F238E27FC236}">
+                <a16:creationId xmlns:a16="http://schemas.microsoft.com/office/drawing/2014/main" id="{66AEBE8A-AA93-99E1-26BD-7D231844EABE}"/>
+              </a:ext>
+            </a:extLst>
+          </p:cNvPr>
+          <p:cNvSpPr>
+            <a:spLocks noGrp="1"/>
+          </p:cNvSpPr>
+          <p:nvPr>
+            <p:ph type="title"/>
+          </p:nvPr>
+        </p:nvSpPr>
+        <p:spPr/>
+        <p:txBody>
+          <a:bodyPr/>
+          <a:lstStyle/>
+          <a:p>
+            <a:r>
+              <a:rPr lang="cs-CZ"/>
+              <a:t>Kliknutím lze upravit styl.</a:t>
+            </a:r>
+          </a:p>
+        </p:txBody>
+      </p:sp>
+      <p:sp>
+        <p:nvSpPr>
+          <p:cNvPr id="3" name="Zástupný symbol pro datum 2">
+            <a:extLst>
+              <a:ext uri="{FF2B5EF4-FFF2-40B4-BE49-F238E27FC236}">
+                <a16:creationId xmlns:a16="http://schemas.microsoft.com/office/drawing/2014/main" id="{16969D8B-E29E-38CB-E70D-B7E5EADCA884}"/>
+              </a:ext>
+            </a:extLst>
+          </p:cNvPr>
+          <p:cNvSpPr>
+            <a:spLocks noGrp="1"/>
+          </p:cNvSpPr>
+          <p:nvPr>
+            <p:ph type="dt" sz="half" idx="10"/>
+          </p:nvPr>
+        </p:nvSpPr>
+        <p:spPr/>
+        <p:txBody>
+          <a:bodyPr/>
+          <a:lstStyle/>
+          <a:p>
+            <a:fld id="{6DB30A3A-EBE1-42FC-9BF1-79FFB867F05B}" type="datetimeFigureOut">
+              <a:rPr lang="cs-CZ" smtClean="0"/>
+              <a:t>04.01.2026</a:t>
+            </a:fld>
+            <a:endParaRPr lang="cs-CZ"/>
+          </a:p>
+        </p:txBody>
+      </p:sp>
+      <p:sp>
+        <p:nvSpPr>
+          <p:cNvPr id="4" name="Zástupný symbol pro zápatí 3">
+            <a:extLst>
+              <a:ext uri="{FF2B5EF4-FFF2-40B4-BE49-F238E27FC236}">
+                <a16:creationId xmlns:a16="http://schemas.microsoft.com/office/drawing/2014/main" id="{0714A777-FB9C-C037-DC53-B4A7ADC07319}"/>
+              </a:ext>
+            </a:extLst>
+          </p:cNvPr>
+          <p:cNvSpPr>
+            <a:spLocks noGrp="1"/>
+          </p:cNvSpPr>
+          <p:nvPr>
+            <p:ph type="ftr" sz="quarter" idx="11"/>
+          </p:nvPr>
+        </p:nvSpPr>
+        <p:spPr/>
+        <p:txBody>
+          <a:bodyPr/>
+          <a:lstStyle/>
+          <a:p>
+            <a:endParaRPr lang="cs-CZ"/>
+          </a:p>
+        </p:txBody>
+      </p:sp>
+      <p:sp>
+        <p:nvSpPr>
+          <p:cNvPr id="5" name="Zástupný symbol pro číslo snímku 4">
+            <a:extLst>
+              <a:ext uri="{FF2B5EF4-FFF2-40B4-BE49-F238E27FC236}">
+                <a16:creationId xmlns:a16="http://schemas.microsoft.com/office/drawing/2014/main" id="{4FB10C04-DEB3-C9DD-01D2-B25CFD04A3DE}"/>
+              </a:ext>
+            </a:extLst>
+          </p:cNvPr>
+          <p:cNvSpPr>
+            <a:spLocks noGrp="1"/>
+          </p:cNvSpPr>
+          <p:nvPr>
+            <p:ph type="sldNum" sz="quarter" idx="12"/>
+          </p:nvPr>
+        </p:nvSpPr>
+        <p:spPr/>
+        <p:txBody>
+          <a:bodyPr/>
+          <a:lstStyle/>
+          <a:p>
+            <a:fld id="{32129535-2FF0-4674-BDE8-A1FD8B542E18}" type="slidenum">
+              <a:rPr lang="cs-CZ" smtClean="0"/>
+              <a:t>‹#›</a:t>
+            </a:fld>
+            <a:endParaRPr lang="cs-CZ"/>
+          </a:p>
+        </p:txBody>
+      </p:sp>
+    </p:spTree>
+    <p:extLst>
+      <p:ext uri="{BB962C8B-B14F-4D97-AF65-F5344CB8AC3E}">
+        <p14:creationId xmlns:p14="http://schemas.microsoft.com/office/powerpoint/2010/main" val="3067092991"/>
+      </p:ext>
+    </p:extLst>
+  </p:cSld>
+  <p:clrMapOvr>
+    <a:masterClrMapping/>
+  </p:clrMapOvr>
+</p:sldLayout>
+</file>
+
+<file path=ppt/slideLayouts/slideLayout7.xml><?xml version="1.0" encoding="utf-8"?>
+<p:sldLayout xmlns:a="http://schemas.openxmlformats.org/drawingml/2006/main" xmlns:r="http://schemas.openxmlformats.org/officeDocument/2006/relationships" xmlns:p="http://schemas.openxmlformats.org/presentationml/2006/main" type="blank" preserve="1">
+  <p:cSld name="Prázdný">
+    <p:spTree>
+      <p:nvGrpSpPr>
+        <p:cNvPr id="1" name=""/>
+        <p:cNvGrpSpPr/>
+        <p:nvPr/>
+      </p:nvGrpSpPr>
+      <p:grpSpPr>
+        <a:xfrm>
+          <a:off x="0" y="0"/>
+          <a:ext cx="0" cy="0"/>
+          <a:chOff x="0" y="0"/>
+          <a:chExt cx="0" cy="0"/>
+        </a:xfrm>
+      </p:grpSpPr>
+      <p:sp>
+        <p:nvSpPr>
+          <p:cNvPr id="2" name="Zástupný symbol pro datum 1">
+            <a:extLst>
+              <a:ext uri="{FF2B5EF4-FFF2-40B4-BE49-F238E27FC236}">
+                <a16:creationId xmlns:a16="http://schemas.microsoft.com/office/drawing/2014/main" id="{80E8D925-DAB6-8E72-82D1-A882B5DE6028}"/>
+              </a:ext>
+            </a:extLst>
+          </p:cNvPr>
+          <p:cNvSpPr>
+            <a:spLocks noGrp="1"/>
+          </p:cNvSpPr>
+          <p:nvPr>
+            <p:ph type="dt" sz="half" idx="10"/>
+          </p:nvPr>
+        </p:nvSpPr>
+        <p:spPr/>
+        <p:txBody>
+          <a:bodyPr/>
+          <a:lstStyle/>
+          <a:p>
+            <a:fld id="{6DB30A3A-EBE1-42FC-9BF1-79FFB867F05B}" type="datetimeFigureOut">
+              <a:rPr lang="cs-CZ" smtClean="0"/>
+              <a:t>04.01.2026</a:t>
+            </a:fld>
+            <a:endParaRPr lang="cs-CZ"/>
+          </a:p>
+        </p:txBody>
+      </p:sp>
+      <p:sp>
+        <p:nvSpPr>
+          <p:cNvPr id="3" name="Zástupný symbol pro zápatí 2">
+            <a:extLst>
+              <a:ext uri="{FF2B5EF4-FFF2-40B4-BE49-F238E27FC236}">
+                <a16:creationId xmlns:a16="http://schemas.microsoft.com/office/drawing/2014/main" id="{AE117FA1-AD56-AB0C-7E97-7F19ACF395FF}"/>
+              </a:ext>
+            </a:extLst>
+          </p:cNvPr>
+          <p:cNvSpPr>
+            <a:spLocks noGrp="1"/>
+          </p:cNvSpPr>
+          <p:nvPr>
+            <p:ph type="ftr" sz="quarter" idx="11"/>
+          </p:nvPr>
+        </p:nvSpPr>
+        <p:spPr/>
+        <p:txBody>
+          <a:bodyPr/>
+          <a:lstStyle/>
+          <a:p>
+            <a:endParaRPr lang="cs-CZ"/>
+          </a:p>
+        </p:txBody>
+      </p:sp>
+      <p:sp>
+        <p:nvSpPr>
+          <p:cNvPr id="4" name="Zástupný symbol pro číslo snímku 3">
+            <a:extLst>
+              <a:ext uri="{FF2B5EF4-FFF2-40B4-BE49-F238E27FC236}">
+                <a16:creationId xmlns:a16="http://schemas.microsoft.com/office/drawing/2014/main" id="{3105023D-0D49-4C53-9B5B-4EAE6F14700A}"/>
+              </a:ext>
+            </a:extLst>
+          </p:cNvPr>
+          <p:cNvSpPr>
+            <a:spLocks noGrp="1"/>
+          </p:cNvSpPr>
+          <p:nvPr>
+            <p:ph type="sldNum" sz="quarter" idx="12"/>
+          </p:nvPr>
+        </p:nvSpPr>
+        <p:spPr/>
+        <p:txBody>
+          <a:bodyPr/>
+          <a:lstStyle/>
+          <a:p>
+            <a:fld id="{32129535-2FF0-4674-BDE8-A1FD8B542E18}" type="slidenum">
+              <a:rPr lang="cs-CZ" smtClean="0"/>
+              <a:t>‹#›</a:t>
+            </a:fld>
+            <a:endParaRPr lang="cs-CZ"/>
+          </a:p>
+        </p:txBody>
+      </p:sp>
+    </p:spTree>
+    <p:extLst>
+      <p:ext uri="{BB962C8B-B14F-4D97-AF65-F5344CB8AC3E}">
+        <p14:creationId xmlns:p14="http://schemas.microsoft.com/office/powerpoint/2010/main" val="453993453"/>
+      </p:ext>
+    </p:extLst>
+  </p:cSld>
+  <p:clrMapOvr>
+    <a:masterClrMapping/>
+  </p:clrMapOvr>
+</p:sldLayout>
+</file>
+
+<file path=ppt/slideLayouts/slideLayout8.xml><?xml version="1.0" encoding="utf-8"?>
+<p:sldLayout xmlns:a="http://schemas.openxmlformats.org/drawingml/2006/main" xmlns:r="http://schemas.openxmlformats.org/officeDocument/2006/relationships" xmlns:p="http://schemas.openxmlformats.org/presentationml/2006/main" type="objTx" preserve="1">
+  <p:cSld name="Obsah s titulkem">
+    <p:spTree>
+      <p:nvGrpSpPr>
+        <p:cNvPr id="1" name=""/>
+        <p:cNvGrpSpPr/>
+        <p:nvPr/>
+      </p:nvGrpSpPr>
+      <p:grpSpPr>
+        <a:xfrm>
+          <a:off x="0" y="0"/>
+          <a:ext cx="0" cy="0"/>
+          <a:chOff x="0" y="0"/>
+          <a:chExt cx="0" cy="0"/>
+        </a:xfrm>
+      </p:grpSpPr>
+      <p:sp>
+        <p:nvSpPr>
+          <p:cNvPr id="2" name="Nadpis 1">
+            <a:extLst>
+              <a:ext uri="{FF2B5EF4-FFF2-40B4-BE49-F238E27FC236}">
+                <a16:creationId xmlns:a16="http://schemas.microsoft.com/office/drawing/2014/main" id="{94F483CA-3D63-FF6B-025C-C6147493C64E}"/>
               </a:ext>
             </a:extLst>
           </p:cNvPr>
@@ -1799,18 +2187,18 @@
           </a:lstStyle>
           <a:p>
             <a:r>
-              <a:rPr lang="en-US"/>
-              <a:t>Click to edit Master title style</a:t>
-            </a:r>
-          </a:p>
-        </p:txBody>
-      </p:sp>
-      <p:sp>
-        <p:nvSpPr>
-          <p:cNvPr id="3" name="Content Placeholder 2">
-            <a:extLst>
-              <a:ext uri="{FF2B5EF4-FFF2-40B4-BE49-F238E27FC236}">
-                <a16:creationId xmlns:a16="http://schemas.microsoft.com/office/drawing/2014/main" id="{2D6CA762-AF4E-717F-5C86-F9E96EC437E6}"/>
+              <a:rPr lang="cs-CZ"/>
+              <a:t>Kliknutím lze upravit styl.</a:t>
+            </a:r>
+          </a:p>
+        </p:txBody>
+      </p:sp>
+      <p:sp>
+        <p:nvSpPr>
+          <p:cNvPr id="3" name="Zástupný obsah 2">
+            <a:extLst>
+              <a:ext uri="{FF2B5EF4-FFF2-40B4-BE49-F238E27FC236}">
+                <a16:creationId xmlns:a16="http://schemas.microsoft.com/office/drawing/2014/main" id="{5B27E827-A76B-90EE-7BBA-9FD8ACADD74B}"/>
               </a:ext>
             </a:extLst>
           </p:cNvPr>
@@ -1861,46 +2249,46 @@
           <a:p>
             <a:pPr lvl="0"/>
             <a:r>
-              <a:rPr lang="en-US"/>
-              <a:t>Click to edit Master text styles</a:t>
+              <a:rPr lang="cs-CZ"/>
+              <a:t>Po kliknutí můžete upravovat styly textu v předloze.</a:t>
             </a:r>
           </a:p>
           <a:p>
             <a:pPr lvl="1"/>
             <a:r>
-              <a:rPr lang="en-US"/>
-              <a:t>Second level</a:t>
+              <a:rPr lang="cs-CZ"/>
+              <a:t>Druhá úroveň</a:t>
             </a:r>
           </a:p>
           <a:p>
             <a:pPr lvl="2"/>
             <a:r>
-              <a:rPr lang="en-US"/>
-              <a:t>Third level</a:t>
+              <a:rPr lang="cs-CZ"/>
+              <a:t>Třetí úroveň</a:t>
             </a:r>
           </a:p>
           <a:p>
             <a:pPr lvl="3"/>
             <a:r>
-              <a:rPr lang="en-US"/>
-              <a:t>Fourth level</a:t>
+              <a:rPr lang="cs-CZ"/>
+              <a:t>Čtvrtá úroveň</a:t>
             </a:r>
           </a:p>
           <a:p>
             <a:pPr lvl="4"/>
             <a:r>
-              <a:rPr lang="en-US"/>
-              <a:t>Fifth level</a:t>
-            </a:r>
-          </a:p>
-        </p:txBody>
-      </p:sp>
-      <p:sp>
-        <p:nvSpPr>
-          <p:cNvPr id="4" name="Text Placeholder 3">
-            <a:extLst>
-              <a:ext uri="{FF2B5EF4-FFF2-40B4-BE49-F238E27FC236}">
-                <a16:creationId xmlns:a16="http://schemas.microsoft.com/office/drawing/2014/main" id="{19234FAC-F6D8-B1F1-B496-E1EEA8ADB68A}"/>
+              <a:rPr lang="cs-CZ"/>
+              <a:t>Pátá úroveň</a:t>
+            </a:r>
+          </a:p>
+        </p:txBody>
+      </p:sp>
+      <p:sp>
+        <p:nvSpPr>
+          <p:cNvPr id="4" name="Zástupný text 3">
+            <a:extLst>
+              <a:ext uri="{FF2B5EF4-FFF2-40B4-BE49-F238E27FC236}">
+                <a16:creationId xmlns:a16="http://schemas.microsoft.com/office/drawing/2014/main" id="{287DB83C-F553-8569-F3A6-101943E39BE8}"/>
               </a:ext>
             </a:extLst>
           </p:cNvPr>
@@ -1960,18 +2348,18 @@
           <a:p>
             <a:pPr lvl="0"/>
             <a:r>
-              <a:rPr lang="en-US"/>
-              <a:t>Click to edit Master text styles</a:t>
-            </a:r>
-          </a:p>
-        </p:txBody>
-      </p:sp>
-      <p:sp>
-        <p:nvSpPr>
-          <p:cNvPr id="5" name="Date Placeholder 4">
-            <a:extLst>
-              <a:ext uri="{FF2B5EF4-FFF2-40B4-BE49-F238E27FC236}">
-                <a16:creationId xmlns:a16="http://schemas.microsoft.com/office/drawing/2014/main" id="{04BEB883-1938-A0F8-B385-13DB9E3AF34D}"/>
+              <a:rPr lang="cs-CZ"/>
+              <a:t>Po kliknutí můžete upravovat styly textu v předloze.</a:t>
+            </a:r>
+          </a:p>
+        </p:txBody>
+      </p:sp>
+      <p:sp>
+        <p:nvSpPr>
+          <p:cNvPr id="5" name="Zástupný symbol pro datum 4">
+            <a:extLst>
+              <a:ext uri="{FF2B5EF4-FFF2-40B4-BE49-F238E27FC236}">
+                <a16:creationId xmlns:a16="http://schemas.microsoft.com/office/drawing/2014/main" id="{9D1280F0-BF26-A41F-3E4F-893105A71C4B}"/>
               </a:ext>
             </a:extLst>
           </p:cNvPr>
@@ -1987,20 +2375,20 @@
           <a:bodyPr/>
           <a:lstStyle/>
           <a:p>
-            <a:fld id="{0018DC77-AFD7-447A-A41B-36AE4CC7F50D}" type="datetimeFigureOut">
-              <a:rPr lang="en-US" smtClean="0"/>
-              <a:t>2/8/2025</a:t>
+            <a:fld id="{6DB30A3A-EBE1-42FC-9BF1-79FFB867F05B}" type="datetimeFigureOut">
+              <a:rPr lang="cs-CZ" smtClean="0"/>
+              <a:t>04.01.2026</a:t>
             </a:fld>
-            <a:endParaRPr lang="en-US"/>
-          </a:p>
-        </p:txBody>
-      </p:sp>
-      <p:sp>
-        <p:nvSpPr>
-          <p:cNvPr id="6" name="Footer Placeholder 5">
-            <a:extLst>
-              <a:ext uri="{FF2B5EF4-FFF2-40B4-BE49-F238E27FC236}">
-                <a16:creationId xmlns:a16="http://schemas.microsoft.com/office/drawing/2014/main" id="{39FD0211-2E8E-212D-4028-71CEF08119A7}"/>
+            <a:endParaRPr lang="cs-CZ"/>
+          </a:p>
+        </p:txBody>
+      </p:sp>
+      <p:sp>
+        <p:nvSpPr>
+          <p:cNvPr id="6" name="Zástupný symbol pro zápatí 5">
+            <a:extLst>
+              <a:ext uri="{FF2B5EF4-FFF2-40B4-BE49-F238E27FC236}">
+                <a16:creationId xmlns:a16="http://schemas.microsoft.com/office/drawing/2014/main" id="{14118E95-86C6-C1F7-60C7-39C9BA4961D0}"/>
               </a:ext>
             </a:extLst>
           </p:cNvPr>
@@ -2016,16 +2404,16 @@
           <a:bodyPr/>
           <a:lstStyle/>
           <a:p>
-            <a:endParaRPr lang="en-US"/>
-          </a:p>
-        </p:txBody>
-      </p:sp>
-      <p:sp>
-        <p:nvSpPr>
-          <p:cNvPr id="7" name="Slide Number Placeholder 6">
-            <a:extLst>
-              <a:ext uri="{FF2B5EF4-FFF2-40B4-BE49-F238E27FC236}">
-                <a16:creationId xmlns:a16="http://schemas.microsoft.com/office/drawing/2014/main" id="{4E938613-2A26-6669-CB9E-F87BBC486221}"/>
+            <a:endParaRPr lang="cs-CZ"/>
+          </a:p>
+        </p:txBody>
+      </p:sp>
+      <p:sp>
+        <p:nvSpPr>
+          <p:cNvPr id="7" name="Zástupný symbol pro číslo snímku 6">
+            <a:extLst>
+              <a:ext uri="{FF2B5EF4-FFF2-40B4-BE49-F238E27FC236}">
+                <a16:creationId xmlns:a16="http://schemas.microsoft.com/office/drawing/2014/main" id="{23E6306C-16D0-331A-7B88-0845DB0C9392}"/>
               </a:ext>
             </a:extLst>
           </p:cNvPr>
@@ -2041,18 +2429,18 @@
           <a:bodyPr/>
           <a:lstStyle/>
           <a:p>
-            <a:fld id="{6B2E6DA3-2A58-4FDF-9A98-658FEFDD9C33}" type="slidenum">
-              <a:rPr lang="en-US" smtClean="0"/>
+            <a:fld id="{32129535-2FF0-4674-BDE8-A1FD8B542E18}" type="slidenum">
+              <a:rPr lang="cs-CZ" smtClean="0"/>
               <a:t>‹#›</a:t>
             </a:fld>
-            <a:endParaRPr lang="en-US"/>
+            <a:endParaRPr lang="cs-CZ"/>
           </a:p>
         </p:txBody>
       </p:sp>
     </p:spTree>
     <p:extLst>
       <p:ext uri="{BB962C8B-B14F-4D97-AF65-F5344CB8AC3E}">
-        <p14:creationId xmlns:p14="http://schemas.microsoft.com/office/powerpoint/2010/main" val="3160172645"/>
+        <p14:creationId xmlns:p14="http://schemas.microsoft.com/office/powerpoint/2010/main" val="1807671664"/>
       </p:ext>
     </p:extLst>
   </p:cSld>
@@ -2062,9 +2450,9 @@
 </p:sldLayout>
 </file>
 
-<file path=ppt/slideLayouts/slideLayout7.xml><?xml version="1.0" encoding="utf-8"?>
-<p:sldLayout xmlns:a="http://schemas.openxmlformats.org/drawingml/2006/main" xmlns:r="http://schemas.openxmlformats.org/officeDocument/2006/relationships" xmlns:p="http://schemas.openxmlformats.org/presentationml/2006/main" type="blank" preserve="1">
-  <p:cSld name="Blank">
+<file path=ppt/slideLayouts/slideLayout9.xml><?xml version="1.0" encoding="utf-8"?>
+<p:sldLayout xmlns:a="http://schemas.openxmlformats.org/drawingml/2006/main" xmlns:r="http://schemas.openxmlformats.org/officeDocument/2006/relationships" xmlns:p="http://schemas.openxmlformats.org/presentationml/2006/main" type="picTx" preserve="1">
+  <p:cSld name="Obrázek s titulkem">
     <p:spTree>
       <p:nvGrpSpPr>
         <p:cNvPr id="1" name=""/>
@@ -2081,398 +2469,10 @@
       </p:grpSpPr>
       <p:sp>
         <p:nvSpPr>
-          <p:cNvPr id="2" name="Date Placeholder 1">
-            <a:extLst>
-              <a:ext uri="{FF2B5EF4-FFF2-40B4-BE49-F238E27FC236}">
-                <a16:creationId xmlns:a16="http://schemas.microsoft.com/office/drawing/2014/main" id="{91774CA6-7D54-388E-CF55-5C30ACFF654B}"/>
-              </a:ext>
-            </a:extLst>
-          </p:cNvPr>
-          <p:cNvSpPr>
-            <a:spLocks noGrp="1"/>
-          </p:cNvSpPr>
-          <p:nvPr>
-            <p:ph type="dt" sz="half" idx="10"/>
-          </p:nvPr>
-        </p:nvSpPr>
-        <p:spPr/>
-        <p:txBody>
-          <a:bodyPr/>
-          <a:lstStyle/>
-          <a:p>
-            <a:fld id="{0018DC77-AFD7-447A-A41B-36AE4CC7F50D}" type="datetimeFigureOut">
-              <a:rPr lang="en-US" smtClean="0"/>
-              <a:t>2/8/2025</a:t>
-            </a:fld>
-            <a:endParaRPr lang="en-US"/>
-          </a:p>
-        </p:txBody>
-      </p:sp>
-      <p:sp>
-        <p:nvSpPr>
-          <p:cNvPr id="3" name="Footer Placeholder 2">
-            <a:extLst>
-              <a:ext uri="{FF2B5EF4-FFF2-40B4-BE49-F238E27FC236}">
-                <a16:creationId xmlns:a16="http://schemas.microsoft.com/office/drawing/2014/main" id="{2F8F80D7-9BA5-8654-2D53-3D002C923A41}"/>
-              </a:ext>
-            </a:extLst>
-          </p:cNvPr>
-          <p:cNvSpPr>
-            <a:spLocks noGrp="1"/>
-          </p:cNvSpPr>
-          <p:nvPr>
-            <p:ph type="ftr" sz="quarter" idx="11"/>
-          </p:nvPr>
-        </p:nvSpPr>
-        <p:spPr/>
-        <p:txBody>
-          <a:bodyPr/>
-          <a:lstStyle/>
-          <a:p>
-            <a:endParaRPr lang="en-US"/>
-          </a:p>
-        </p:txBody>
-      </p:sp>
-      <p:sp>
-        <p:nvSpPr>
-          <p:cNvPr id="4" name="Slide Number Placeholder 3">
-            <a:extLst>
-              <a:ext uri="{FF2B5EF4-FFF2-40B4-BE49-F238E27FC236}">
-                <a16:creationId xmlns:a16="http://schemas.microsoft.com/office/drawing/2014/main" id="{CB1A85FF-470D-32DD-413E-8A841A5200F7}"/>
-              </a:ext>
-            </a:extLst>
-          </p:cNvPr>
-          <p:cNvSpPr>
-            <a:spLocks noGrp="1"/>
-          </p:cNvSpPr>
-          <p:nvPr>
-            <p:ph type="sldNum" sz="quarter" idx="12"/>
-          </p:nvPr>
-        </p:nvSpPr>
-        <p:spPr/>
-        <p:txBody>
-          <a:bodyPr/>
-          <a:lstStyle/>
-          <a:p>
-            <a:fld id="{6B2E6DA3-2A58-4FDF-9A98-658FEFDD9C33}" type="slidenum">
-              <a:rPr lang="en-US" smtClean="0"/>
-              <a:t>‹#›</a:t>
-            </a:fld>
-            <a:endParaRPr lang="en-US"/>
-          </a:p>
-        </p:txBody>
-      </p:sp>
-    </p:spTree>
-    <p:extLst>
-      <p:ext uri="{BB962C8B-B14F-4D97-AF65-F5344CB8AC3E}">
-        <p14:creationId xmlns:p14="http://schemas.microsoft.com/office/powerpoint/2010/main" val="2316840211"/>
-      </p:ext>
-    </p:extLst>
-  </p:cSld>
-  <p:clrMapOvr>
-    <a:masterClrMapping/>
-  </p:clrMapOvr>
-</p:sldLayout>
-</file>
-
-<file path=ppt/slideLayouts/slideLayout8.xml><?xml version="1.0" encoding="utf-8"?>
-<p:sldLayout xmlns:a="http://schemas.openxmlformats.org/drawingml/2006/main" xmlns:r="http://schemas.openxmlformats.org/officeDocument/2006/relationships" xmlns:p="http://schemas.openxmlformats.org/presentationml/2006/main" type="secHead" preserve="1">
-  <p:cSld name="Section Header">
-    <p:spTree>
-      <p:nvGrpSpPr>
-        <p:cNvPr id="1" name=""/>
-        <p:cNvGrpSpPr/>
-        <p:nvPr/>
-      </p:nvGrpSpPr>
-      <p:grpSpPr>
-        <a:xfrm>
-          <a:off x="0" y="0"/>
-          <a:ext cx="0" cy="0"/>
-          <a:chOff x="0" y="0"/>
-          <a:chExt cx="0" cy="0"/>
-        </a:xfrm>
-      </p:grpSpPr>
-      <p:sp>
-        <p:nvSpPr>
-          <p:cNvPr id="2" name="Title 1">
-            <a:extLst>
-              <a:ext uri="{FF2B5EF4-FFF2-40B4-BE49-F238E27FC236}">
-                <a16:creationId xmlns:a16="http://schemas.microsoft.com/office/drawing/2014/main" id="{5E33F6EF-FD05-8389-E390-AB5B41313FD8}"/>
-              </a:ext>
-            </a:extLst>
-          </p:cNvPr>
-          <p:cNvSpPr>
-            <a:spLocks noGrp="1"/>
-          </p:cNvSpPr>
-          <p:nvPr>
-            <p:ph type="title"/>
-          </p:nvPr>
-        </p:nvSpPr>
-        <p:spPr>
-          <a:xfrm>
-            <a:off x="831850" y="1709738"/>
-            <a:ext cx="10515600" cy="2852737"/>
-          </a:xfrm>
-        </p:spPr>
-        <p:txBody>
-          <a:bodyPr anchor="b"/>
-          <a:lstStyle>
-            <a:lvl1pPr>
-              <a:defRPr sz="6000"/>
-            </a:lvl1pPr>
-          </a:lstStyle>
-          <a:p>
-            <a:r>
-              <a:rPr lang="en-US"/>
-              <a:t>Click to edit Master title style</a:t>
-            </a:r>
-          </a:p>
-        </p:txBody>
-      </p:sp>
-      <p:sp>
-        <p:nvSpPr>
-          <p:cNvPr id="3" name="Text Placeholder 2">
-            <a:extLst>
-              <a:ext uri="{FF2B5EF4-FFF2-40B4-BE49-F238E27FC236}">
-                <a16:creationId xmlns:a16="http://schemas.microsoft.com/office/drawing/2014/main" id="{B28D2F6E-8E35-CC71-96C7-989AF927F726}"/>
-              </a:ext>
-            </a:extLst>
-          </p:cNvPr>
-          <p:cNvSpPr>
-            <a:spLocks noGrp="1"/>
-          </p:cNvSpPr>
-          <p:nvPr>
-            <p:ph type="body" idx="1"/>
-          </p:nvPr>
-        </p:nvSpPr>
-        <p:spPr>
-          <a:xfrm>
-            <a:off x="831850" y="4589463"/>
-            <a:ext cx="10515600" cy="1500187"/>
-          </a:xfrm>
-        </p:spPr>
-        <p:txBody>
-          <a:bodyPr/>
-          <a:lstStyle>
-            <a:lvl1pPr marL="0" indent="0">
-              <a:buNone/>
-              <a:defRPr sz="2400">
-                <a:solidFill>
-                  <a:schemeClr val="tx1">
-                    <a:tint val="82000"/>
-                  </a:schemeClr>
-                </a:solidFill>
-              </a:defRPr>
-            </a:lvl1pPr>
-            <a:lvl2pPr marL="457200" indent="0">
-              <a:buNone/>
-              <a:defRPr sz="2000">
-                <a:solidFill>
-                  <a:schemeClr val="tx1">
-                    <a:tint val="82000"/>
-                  </a:schemeClr>
-                </a:solidFill>
-              </a:defRPr>
-            </a:lvl2pPr>
-            <a:lvl3pPr marL="914400" indent="0">
-              <a:buNone/>
-              <a:defRPr sz="1800">
-                <a:solidFill>
-                  <a:schemeClr val="tx1">
-                    <a:tint val="82000"/>
-                  </a:schemeClr>
-                </a:solidFill>
-              </a:defRPr>
-            </a:lvl3pPr>
-            <a:lvl4pPr marL="1371600" indent="0">
-              <a:buNone/>
-              <a:defRPr sz="1600">
-                <a:solidFill>
-                  <a:schemeClr val="tx1">
-                    <a:tint val="82000"/>
-                  </a:schemeClr>
-                </a:solidFill>
-              </a:defRPr>
-            </a:lvl4pPr>
-            <a:lvl5pPr marL="1828800" indent="0">
-              <a:buNone/>
-              <a:defRPr sz="1600">
-                <a:solidFill>
-                  <a:schemeClr val="tx1">
-                    <a:tint val="82000"/>
-                  </a:schemeClr>
-                </a:solidFill>
-              </a:defRPr>
-            </a:lvl5pPr>
-            <a:lvl6pPr marL="2286000" indent="0">
-              <a:buNone/>
-              <a:defRPr sz="1600">
-                <a:solidFill>
-                  <a:schemeClr val="tx1">
-                    <a:tint val="82000"/>
-                  </a:schemeClr>
-                </a:solidFill>
-              </a:defRPr>
-            </a:lvl6pPr>
-            <a:lvl7pPr marL="2743200" indent="0">
-              <a:buNone/>
-              <a:defRPr sz="1600">
-                <a:solidFill>
-                  <a:schemeClr val="tx1">
-                    <a:tint val="82000"/>
-                  </a:schemeClr>
-                </a:solidFill>
-              </a:defRPr>
-            </a:lvl7pPr>
-            <a:lvl8pPr marL="3200400" indent="0">
-              <a:buNone/>
-              <a:defRPr sz="1600">
-                <a:solidFill>
-                  <a:schemeClr val="tx1">
-                    <a:tint val="82000"/>
-                  </a:schemeClr>
-                </a:solidFill>
-              </a:defRPr>
-            </a:lvl8pPr>
-            <a:lvl9pPr marL="3657600" indent="0">
-              <a:buNone/>
-              <a:defRPr sz="1600">
-                <a:solidFill>
-                  <a:schemeClr val="tx1">
-                    <a:tint val="82000"/>
-                  </a:schemeClr>
-                </a:solidFill>
-              </a:defRPr>
-            </a:lvl9pPr>
-          </a:lstStyle>
-          <a:p>
-            <a:pPr lvl="0"/>
-            <a:r>
-              <a:rPr lang="en-US"/>
-              <a:t>Click to edit Master text styles</a:t>
-            </a:r>
-          </a:p>
-        </p:txBody>
-      </p:sp>
-      <p:sp>
-        <p:nvSpPr>
-          <p:cNvPr id="4" name="Date Placeholder 3">
-            <a:extLst>
-              <a:ext uri="{FF2B5EF4-FFF2-40B4-BE49-F238E27FC236}">
-                <a16:creationId xmlns:a16="http://schemas.microsoft.com/office/drawing/2014/main" id="{B6A23F4E-A7F6-04C9-36F7-DDF64905B1C8}"/>
-              </a:ext>
-            </a:extLst>
-          </p:cNvPr>
-          <p:cNvSpPr>
-            <a:spLocks noGrp="1"/>
-          </p:cNvSpPr>
-          <p:nvPr>
-            <p:ph type="dt" sz="half" idx="10"/>
-          </p:nvPr>
-        </p:nvSpPr>
-        <p:spPr/>
-        <p:txBody>
-          <a:bodyPr/>
-          <a:lstStyle/>
-          <a:p>
-            <a:fld id="{0018DC77-AFD7-447A-A41B-36AE4CC7F50D}" type="datetimeFigureOut">
-              <a:rPr lang="en-US" smtClean="0"/>
-              <a:t>2/8/2025</a:t>
-            </a:fld>
-            <a:endParaRPr lang="en-US"/>
-          </a:p>
-        </p:txBody>
-      </p:sp>
-      <p:sp>
-        <p:nvSpPr>
-          <p:cNvPr id="5" name="Footer Placeholder 4">
-            <a:extLst>
-              <a:ext uri="{FF2B5EF4-FFF2-40B4-BE49-F238E27FC236}">
-                <a16:creationId xmlns:a16="http://schemas.microsoft.com/office/drawing/2014/main" id="{47DEDF5A-00F6-26B0-D69B-2BF04360C02E}"/>
-              </a:ext>
-            </a:extLst>
-          </p:cNvPr>
-          <p:cNvSpPr>
-            <a:spLocks noGrp="1"/>
-          </p:cNvSpPr>
-          <p:nvPr>
-            <p:ph type="ftr" sz="quarter" idx="11"/>
-          </p:nvPr>
-        </p:nvSpPr>
-        <p:spPr/>
-        <p:txBody>
-          <a:bodyPr/>
-          <a:lstStyle/>
-          <a:p>
-            <a:endParaRPr lang="en-US"/>
-          </a:p>
-        </p:txBody>
-      </p:sp>
-      <p:sp>
-        <p:nvSpPr>
-          <p:cNvPr id="6" name="Slide Number Placeholder 5">
-            <a:extLst>
-              <a:ext uri="{FF2B5EF4-FFF2-40B4-BE49-F238E27FC236}">
-                <a16:creationId xmlns:a16="http://schemas.microsoft.com/office/drawing/2014/main" id="{459EB225-74CC-A244-7CDB-C9C6C2F6B16D}"/>
-              </a:ext>
-            </a:extLst>
-          </p:cNvPr>
-          <p:cNvSpPr>
-            <a:spLocks noGrp="1"/>
-          </p:cNvSpPr>
-          <p:nvPr>
-            <p:ph type="sldNum" sz="quarter" idx="12"/>
-          </p:nvPr>
-        </p:nvSpPr>
-        <p:spPr/>
-        <p:txBody>
-          <a:bodyPr/>
-          <a:lstStyle/>
-          <a:p>
-            <a:fld id="{6B2E6DA3-2A58-4FDF-9A98-658FEFDD9C33}" type="slidenum">
-              <a:rPr lang="en-US" smtClean="0"/>
-              <a:t>‹#›</a:t>
-            </a:fld>
-            <a:endParaRPr lang="en-US"/>
-          </a:p>
-        </p:txBody>
-      </p:sp>
-    </p:spTree>
-    <p:extLst>
-      <p:ext uri="{BB962C8B-B14F-4D97-AF65-F5344CB8AC3E}">
-        <p14:creationId xmlns:p14="http://schemas.microsoft.com/office/powerpoint/2010/main" val="3268290393"/>
-      </p:ext>
-    </p:extLst>
-  </p:cSld>
-  <p:clrMapOvr>
-    <a:masterClrMapping/>
-  </p:clrMapOvr>
-</p:sldLayout>
-</file>
-
-<file path=ppt/slideLayouts/slideLayout9.xml><?xml version="1.0" encoding="utf-8"?>
-<p:sldLayout xmlns:a="http://schemas.openxmlformats.org/drawingml/2006/main" xmlns:r="http://schemas.openxmlformats.org/officeDocument/2006/relationships" xmlns:p="http://schemas.openxmlformats.org/presentationml/2006/main" type="picTx" preserve="1">
-  <p:cSld name="Picture with Caption">
-    <p:spTree>
-      <p:nvGrpSpPr>
-        <p:cNvPr id="1" name=""/>
-        <p:cNvGrpSpPr/>
-        <p:nvPr/>
-      </p:nvGrpSpPr>
-      <p:grpSpPr>
-        <a:xfrm>
-          <a:off x="0" y="0"/>
-          <a:ext cx="0" cy="0"/>
-          <a:chOff x="0" y="0"/>
-          <a:chExt cx="0" cy="0"/>
-        </a:xfrm>
-      </p:grpSpPr>
-      <p:sp>
-        <p:nvSpPr>
-          <p:cNvPr id="2" name="Title 1">
-            <a:extLst>
-              <a:ext uri="{FF2B5EF4-FFF2-40B4-BE49-F238E27FC236}">
-                <a16:creationId xmlns:a16="http://schemas.microsoft.com/office/drawing/2014/main" id="{38598789-7C30-C04E-776D-6F22C7F41ACD}"/>
+          <p:cNvPr id="2" name="Nadpis 1">
+            <a:extLst>
+              <a:ext uri="{FF2B5EF4-FFF2-40B4-BE49-F238E27FC236}">
+                <a16:creationId xmlns:a16="http://schemas.microsoft.com/office/drawing/2014/main" id="{5D7E26F1-8E94-4C51-151D-B73E4B07C7E4}"/>
               </a:ext>
             </a:extLst>
           </p:cNvPr>
@@ -2498,18 +2498,18 @@
           </a:lstStyle>
           <a:p>
             <a:r>
-              <a:rPr lang="en-US"/>
-              <a:t>Click to edit Master title style</a:t>
-            </a:r>
-          </a:p>
-        </p:txBody>
-      </p:sp>
-      <p:sp>
-        <p:nvSpPr>
-          <p:cNvPr id="3" name="Picture Placeholder 2">
-            <a:extLst>
-              <a:ext uri="{FF2B5EF4-FFF2-40B4-BE49-F238E27FC236}">
-                <a16:creationId xmlns:a16="http://schemas.microsoft.com/office/drawing/2014/main" id="{F024C2E4-B671-DFC5-9705-987BF25DF717}"/>
+              <a:rPr lang="cs-CZ"/>
+              <a:t>Kliknutím lze upravit styl.</a:t>
+            </a:r>
+          </a:p>
+        </p:txBody>
+      </p:sp>
+      <p:sp>
+        <p:nvSpPr>
+          <p:cNvPr id="3" name="Zástupný symbol obrázku 2">
+            <a:extLst>
+              <a:ext uri="{FF2B5EF4-FFF2-40B4-BE49-F238E27FC236}">
+                <a16:creationId xmlns:a16="http://schemas.microsoft.com/office/drawing/2014/main" id="{7EE5A534-F3CD-246D-1BF1-B9A64CD4CCDD}"/>
               </a:ext>
             </a:extLst>
           </p:cNvPr>
@@ -2567,16 +2567,16 @@
             </a:lvl9pPr>
           </a:lstStyle>
           <a:p>
-            <a:endParaRPr lang="en-US"/>
-          </a:p>
-        </p:txBody>
-      </p:sp>
-      <p:sp>
-        <p:nvSpPr>
-          <p:cNvPr id="4" name="Text Placeholder 3">
-            <a:extLst>
-              <a:ext uri="{FF2B5EF4-FFF2-40B4-BE49-F238E27FC236}">
-                <a16:creationId xmlns:a16="http://schemas.microsoft.com/office/drawing/2014/main" id="{6B935D72-D26D-B1F0-705B-741AB267C380}"/>
+            <a:endParaRPr lang="cs-CZ"/>
+          </a:p>
+        </p:txBody>
+      </p:sp>
+      <p:sp>
+        <p:nvSpPr>
+          <p:cNvPr id="4" name="Zástupný text 3">
+            <a:extLst>
+              <a:ext uri="{FF2B5EF4-FFF2-40B4-BE49-F238E27FC236}">
+                <a16:creationId xmlns:a16="http://schemas.microsoft.com/office/drawing/2014/main" id="{99FEAB8B-7ABF-1C59-EFA6-2F656E3674BF}"/>
               </a:ext>
             </a:extLst>
           </p:cNvPr>
@@ -2636,18 +2636,18 @@
           <a:p>
             <a:pPr lvl="0"/>
             <a:r>
-              <a:rPr lang="en-US"/>
-              <a:t>Click to edit Master text styles</a:t>
-            </a:r>
-          </a:p>
-        </p:txBody>
-      </p:sp>
-      <p:sp>
-        <p:nvSpPr>
-          <p:cNvPr id="5" name="Date Placeholder 4">
-            <a:extLst>
-              <a:ext uri="{FF2B5EF4-FFF2-40B4-BE49-F238E27FC236}">
-                <a16:creationId xmlns:a16="http://schemas.microsoft.com/office/drawing/2014/main" id="{8EE44A15-F97C-F630-8F62-771DC862805F}"/>
+              <a:rPr lang="cs-CZ"/>
+              <a:t>Po kliknutí můžete upravovat styly textu v předloze.</a:t>
+            </a:r>
+          </a:p>
+        </p:txBody>
+      </p:sp>
+      <p:sp>
+        <p:nvSpPr>
+          <p:cNvPr id="5" name="Zástupný symbol pro datum 4">
+            <a:extLst>
+              <a:ext uri="{FF2B5EF4-FFF2-40B4-BE49-F238E27FC236}">
+                <a16:creationId xmlns:a16="http://schemas.microsoft.com/office/drawing/2014/main" id="{F0014FAA-D36B-918D-7362-D9EE35A6606A}"/>
               </a:ext>
             </a:extLst>
           </p:cNvPr>
@@ -2663,20 +2663,20 @@
           <a:bodyPr/>
           <a:lstStyle/>
           <a:p>
-            <a:fld id="{0018DC77-AFD7-447A-A41B-36AE4CC7F50D}" type="datetimeFigureOut">
-              <a:rPr lang="en-US" smtClean="0"/>
-              <a:t>2/8/2025</a:t>
+            <a:fld id="{6DB30A3A-EBE1-42FC-9BF1-79FFB867F05B}" type="datetimeFigureOut">
+              <a:rPr lang="cs-CZ" smtClean="0"/>
+              <a:t>04.01.2026</a:t>
             </a:fld>
-            <a:endParaRPr lang="en-US"/>
-          </a:p>
-        </p:txBody>
-      </p:sp>
-      <p:sp>
-        <p:nvSpPr>
-          <p:cNvPr id="6" name="Footer Placeholder 5">
-            <a:extLst>
-              <a:ext uri="{FF2B5EF4-FFF2-40B4-BE49-F238E27FC236}">
-                <a16:creationId xmlns:a16="http://schemas.microsoft.com/office/drawing/2014/main" id="{76D30F26-ECFC-F10D-2ED8-C52043169886}"/>
+            <a:endParaRPr lang="cs-CZ"/>
+          </a:p>
+        </p:txBody>
+      </p:sp>
+      <p:sp>
+        <p:nvSpPr>
+          <p:cNvPr id="6" name="Zástupný symbol pro zápatí 5">
+            <a:extLst>
+              <a:ext uri="{FF2B5EF4-FFF2-40B4-BE49-F238E27FC236}">
+                <a16:creationId xmlns:a16="http://schemas.microsoft.com/office/drawing/2014/main" id="{31ABFF3D-0E7C-56DA-91A3-D65A50BBFAF1}"/>
               </a:ext>
             </a:extLst>
           </p:cNvPr>
@@ -2692,16 +2692,16 @@
           <a:bodyPr/>
           <a:lstStyle/>
           <a:p>
-            <a:endParaRPr lang="en-US"/>
-          </a:p>
-        </p:txBody>
-      </p:sp>
-      <p:sp>
-        <p:nvSpPr>
-          <p:cNvPr id="7" name="Slide Number Placeholder 6">
-            <a:extLst>
-              <a:ext uri="{FF2B5EF4-FFF2-40B4-BE49-F238E27FC236}">
-                <a16:creationId xmlns:a16="http://schemas.microsoft.com/office/drawing/2014/main" id="{BEF07F89-D495-1A9E-8D99-F2BD9F859423}"/>
+            <a:endParaRPr lang="cs-CZ"/>
+          </a:p>
+        </p:txBody>
+      </p:sp>
+      <p:sp>
+        <p:nvSpPr>
+          <p:cNvPr id="7" name="Zástupný symbol pro číslo snímku 6">
+            <a:extLst>
+              <a:ext uri="{FF2B5EF4-FFF2-40B4-BE49-F238E27FC236}">
+                <a16:creationId xmlns:a16="http://schemas.microsoft.com/office/drawing/2014/main" id="{9EEC90D8-D739-BD01-D935-335DF7AE3055}"/>
               </a:ext>
             </a:extLst>
           </p:cNvPr>
@@ -2717,18 +2717,18 @@
           <a:bodyPr/>
           <a:lstStyle/>
           <a:p>
-            <a:fld id="{6B2E6DA3-2A58-4FDF-9A98-658FEFDD9C33}" type="slidenum">
-              <a:rPr lang="en-US" smtClean="0"/>
+            <a:fld id="{32129535-2FF0-4674-BDE8-A1FD8B542E18}" type="slidenum">
+              <a:rPr lang="cs-CZ" smtClean="0"/>
               <a:t>‹#›</a:t>
             </a:fld>
-            <a:endParaRPr lang="en-US"/>
+            <a:endParaRPr lang="cs-CZ"/>
           </a:p>
         </p:txBody>
       </p:sp>
     </p:spTree>
     <p:extLst>
       <p:ext uri="{BB962C8B-B14F-4D97-AF65-F5344CB8AC3E}">
-        <p14:creationId xmlns:p14="http://schemas.microsoft.com/office/powerpoint/2010/main" val="490656327"/>
+        <p14:creationId xmlns:p14="http://schemas.microsoft.com/office/powerpoint/2010/main" val="2315115452"/>
       </p:ext>
     </p:extLst>
   </p:cSld>
@@ -2762,10 +2762,10 @@
       </p:grpSpPr>
       <p:sp>
         <p:nvSpPr>
-          <p:cNvPr id="2" name="Title Placeholder 1">
-            <a:extLst>
-              <a:ext uri="{FF2B5EF4-FFF2-40B4-BE49-F238E27FC236}">
-                <a16:creationId xmlns:a16="http://schemas.microsoft.com/office/drawing/2014/main" id="{7B23AE1F-070F-2EB1-0269-33A9DCDBA6B5}"/>
+          <p:cNvPr id="2" name="Zástupný nadpis 1">
+            <a:extLst>
+              <a:ext uri="{FF2B5EF4-FFF2-40B4-BE49-F238E27FC236}">
+                <a16:creationId xmlns:a16="http://schemas.microsoft.com/office/drawing/2014/main" id="{8AB3D9A7-C80D-B003-F8A2-95EB3DA5FDD4}"/>
               </a:ext>
             </a:extLst>
           </p:cNvPr>
@@ -2792,18 +2792,18 @@
           <a:lstStyle/>
           <a:p>
             <a:r>
-              <a:rPr lang="en-US"/>
-              <a:t>Click to edit Master title style</a:t>
-            </a:r>
-          </a:p>
-        </p:txBody>
-      </p:sp>
-      <p:sp>
-        <p:nvSpPr>
-          <p:cNvPr id="3" name="Text Placeholder 2">
-            <a:extLst>
-              <a:ext uri="{FF2B5EF4-FFF2-40B4-BE49-F238E27FC236}">
-                <a16:creationId xmlns:a16="http://schemas.microsoft.com/office/drawing/2014/main" id="{9AD13011-7875-8635-2658-58CF55BE2AC9}"/>
+              <a:rPr lang="cs-CZ"/>
+              <a:t>Kliknutím lze upravit styl.</a:t>
+            </a:r>
+          </a:p>
+        </p:txBody>
+      </p:sp>
+      <p:sp>
+        <p:nvSpPr>
+          <p:cNvPr id="3" name="Zástupný text 2">
+            <a:extLst>
+              <a:ext uri="{FF2B5EF4-FFF2-40B4-BE49-F238E27FC236}">
+                <a16:creationId xmlns:a16="http://schemas.microsoft.com/office/drawing/2014/main" id="{A2DA3F0F-9A8D-59F8-7FF8-AF18F2AF5390}"/>
               </a:ext>
             </a:extLst>
           </p:cNvPr>
@@ -2831,46 +2831,46 @@
           <a:p>
             <a:pPr lvl="0"/>
             <a:r>
-              <a:rPr lang="en-US"/>
-              <a:t>Click to edit Master text styles</a:t>
+              <a:rPr lang="cs-CZ"/>
+              <a:t>Po kliknutí můžete upravovat styly textu v předloze.</a:t>
             </a:r>
           </a:p>
           <a:p>
             <a:pPr lvl="1"/>
             <a:r>
-              <a:rPr lang="en-US"/>
-              <a:t>Second level</a:t>
+              <a:rPr lang="cs-CZ"/>
+              <a:t>Druhá úroveň</a:t>
             </a:r>
           </a:p>
           <a:p>
             <a:pPr lvl="2"/>
             <a:r>
-              <a:rPr lang="en-US"/>
-              <a:t>Third level</a:t>
+              <a:rPr lang="cs-CZ"/>
+              <a:t>Třetí úroveň</a:t>
             </a:r>
           </a:p>
           <a:p>
             <a:pPr lvl="3"/>
             <a:r>
-              <a:rPr lang="en-US"/>
-              <a:t>Fourth level</a:t>
+              <a:rPr lang="cs-CZ"/>
+              <a:t>Čtvrtá úroveň</a:t>
             </a:r>
           </a:p>
           <a:p>
             <a:pPr lvl="4"/>
             <a:r>
-              <a:rPr lang="en-US"/>
-              <a:t>Fifth level</a:t>
-            </a:r>
-          </a:p>
-        </p:txBody>
-      </p:sp>
-      <p:sp>
-        <p:nvSpPr>
-          <p:cNvPr id="4" name="Date Placeholder 3">
-            <a:extLst>
-              <a:ext uri="{FF2B5EF4-FFF2-40B4-BE49-F238E27FC236}">
-                <a16:creationId xmlns:a16="http://schemas.microsoft.com/office/drawing/2014/main" id="{D7E7BDEB-9A77-EF3F-636C-B4BD6E1C19BF}"/>
+              <a:rPr lang="cs-CZ"/>
+              <a:t>Pátá úroveň</a:t>
+            </a:r>
+          </a:p>
+        </p:txBody>
+      </p:sp>
+      <p:sp>
+        <p:nvSpPr>
+          <p:cNvPr id="4" name="Zástupný symbol pro datum 3">
+            <a:extLst>
+              <a:ext uri="{FF2B5EF4-FFF2-40B4-BE49-F238E27FC236}">
+                <a16:creationId xmlns:a16="http://schemas.microsoft.com/office/drawing/2014/main" id="{AC4D20F7-BCEC-6AD3-4353-D336146E90F3}"/>
               </a:ext>
             </a:extLst>
           </p:cNvPr>
@@ -2904,20 +2904,20 @@
             </a:lvl1pPr>
           </a:lstStyle>
           <a:p>
-            <a:fld id="{0018DC77-AFD7-447A-A41B-36AE4CC7F50D}" type="datetimeFigureOut">
-              <a:rPr lang="en-US" smtClean="0"/>
-              <a:t>2/8/2025</a:t>
+            <a:fld id="{6DB30A3A-EBE1-42FC-9BF1-79FFB867F05B}" type="datetimeFigureOut">
+              <a:rPr lang="cs-CZ" smtClean="0"/>
+              <a:t>04.01.2026</a:t>
             </a:fld>
-            <a:endParaRPr lang="en-US"/>
-          </a:p>
-        </p:txBody>
-      </p:sp>
-      <p:sp>
-        <p:nvSpPr>
-          <p:cNvPr id="5" name="Footer Placeholder 4">
-            <a:extLst>
-              <a:ext uri="{FF2B5EF4-FFF2-40B4-BE49-F238E27FC236}">
-                <a16:creationId xmlns:a16="http://schemas.microsoft.com/office/drawing/2014/main" id="{A17A5C17-B28C-1B2C-FAB5-000DE933A7C1}"/>
+            <a:endParaRPr lang="cs-CZ"/>
+          </a:p>
+        </p:txBody>
+      </p:sp>
+      <p:sp>
+        <p:nvSpPr>
+          <p:cNvPr id="5" name="Zástupný symbol pro zápatí 4">
+            <a:extLst>
+              <a:ext uri="{FF2B5EF4-FFF2-40B4-BE49-F238E27FC236}">
+                <a16:creationId xmlns:a16="http://schemas.microsoft.com/office/drawing/2014/main" id="{C9D8476B-86D5-C1B0-B448-11BCB51CC5A6}"/>
               </a:ext>
             </a:extLst>
           </p:cNvPr>
@@ -2951,16 +2951,16 @@
             </a:lvl1pPr>
           </a:lstStyle>
           <a:p>
-            <a:endParaRPr lang="en-US"/>
-          </a:p>
-        </p:txBody>
-      </p:sp>
-      <p:sp>
-        <p:nvSpPr>
-          <p:cNvPr id="6" name="Slide Number Placeholder 5">
-            <a:extLst>
-              <a:ext uri="{FF2B5EF4-FFF2-40B4-BE49-F238E27FC236}">
-                <a16:creationId xmlns:a16="http://schemas.microsoft.com/office/drawing/2014/main" id="{FE55751D-8144-1F0F-8D58-025B4DB91C07}"/>
+            <a:endParaRPr lang="cs-CZ"/>
+          </a:p>
+        </p:txBody>
+      </p:sp>
+      <p:sp>
+        <p:nvSpPr>
+          <p:cNvPr id="6" name="Zástupný symbol pro číslo snímku 5">
+            <a:extLst>
+              <a:ext uri="{FF2B5EF4-FFF2-40B4-BE49-F238E27FC236}">
+                <a16:creationId xmlns:a16="http://schemas.microsoft.com/office/drawing/2014/main" id="{4A5F3DCC-850E-8729-8F12-F626DFA9ED6B}"/>
               </a:ext>
             </a:extLst>
           </p:cNvPr>
@@ -2994,31 +2994,31 @@
             </a:lvl1pPr>
           </a:lstStyle>
           <a:p>
-            <a:fld id="{6B2E6DA3-2A58-4FDF-9A98-658FEFDD9C33}" type="slidenum">
-              <a:rPr lang="en-US" smtClean="0"/>
+            <a:fld id="{32129535-2FF0-4674-BDE8-A1FD8B542E18}" type="slidenum">
+              <a:rPr lang="cs-CZ" smtClean="0"/>
               <a:t>‹#›</a:t>
             </a:fld>
-            <a:endParaRPr lang="en-US"/>
+            <a:endParaRPr lang="cs-CZ"/>
           </a:p>
         </p:txBody>
       </p:sp>
     </p:spTree>
     <p:extLst>
       <p:ext uri="{BB962C8B-B14F-4D97-AF65-F5344CB8AC3E}">
-        <p14:creationId xmlns:p14="http://schemas.microsoft.com/office/powerpoint/2010/main" val="2987302682"/>
+        <p14:creationId xmlns:p14="http://schemas.microsoft.com/office/powerpoint/2010/main" val="1993308127"/>
       </p:ext>
     </p:extLst>
   </p:cSld>
   <p:clrMap bg1="lt1" tx1="dk1" bg2="lt2" tx2="dk2" accent1="accent1" accent2="accent2" accent3="accent3" accent4="accent4" accent5="accent5" accent6="accent6" hlink="hlink" folHlink="folHlink"/>
   <p:sldLayoutIdLst>
-    <p:sldLayoutId id="2147483652" r:id="rId1"/>
-    <p:sldLayoutId id="2147483653" r:id="rId2"/>
-    <p:sldLayoutId id="2147483649" r:id="rId3"/>
-    <p:sldLayoutId id="2147483654" r:id="rId4"/>
-    <p:sldLayoutId id="2147483650" r:id="rId5"/>
-    <p:sldLayoutId id="2147483656" r:id="rId6"/>
+    <p:sldLayoutId id="2147483649" r:id="rId1"/>
+    <p:sldLayoutId id="2147483650" r:id="rId2"/>
+    <p:sldLayoutId id="2147483651" r:id="rId3"/>
+    <p:sldLayoutId id="2147483652" r:id="rId4"/>
+    <p:sldLayoutId id="2147483653" r:id="rId5"/>
+    <p:sldLayoutId id="2147483654" r:id="rId6"/>
     <p:sldLayoutId id="2147483655" r:id="rId7"/>
-    <p:sldLayoutId id="2147483651" r:id="rId8"/>
+    <p:sldLayoutId id="2147483656" r:id="rId8"/>
     <p:sldLayoutId id="2147483657" r:id="rId9"/>
     <p:sldLayoutId id="2147483658" r:id="rId10"/>
     <p:sldLayoutId id="2147483659" r:id="rId11"/>
@@ -3209,7 +3209,7 @@
     </p:bodyStyle>
     <p:otherStyle>
       <a:defPPr>
-        <a:defRPr lang="en-US"/>
+        <a:defRPr lang="cs-CZ"/>
       </a:defPPr>
       <a:lvl1pPr marL="0" algn="l" defTabSz="914400" rtl="0" eaLnBrk="1" latinLnBrk="0" hangingPunct="1">
         <a:defRPr sz="1800" kern="1200">
@@ -3307,7 +3307,7 @@
 </file>
 
 <file path=ppt/theme/theme1.xml><?xml version="1.0" encoding="utf-8"?>
-<a:theme xmlns:a="http://schemas.openxmlformats.org/drawingml/2006/main" name="Office Theme">
+<a:theme xmlns:a="http://schemas.openxmlformats.org/drawingml/2006/main" name="Motiv Office">
   <a:themeElements>
     <a:clrScheme name="Office">
       <a:dk1>

</xml_diff>